<commit_message>
Updated the PowerPoint slides
</commit_message>
<xml_diff>
--- a/machine_learning_pp.pptx
+++ b/machine_learning_pp.pptx
@@ -7,7 +7,17 @@
   <p:sldIdLst>
     <p:sldId id="257" r:id="rId2"/>
     <p:sldId id="259" r:id="rId3"/>
-    <p:sldId id="258" r:id="rId4"/>
+    <p:sldId id="260" r:id="rId4"/>
+    <p:sldId id="261" r:id="rId5"/>
+    <p:sldId id="265" r:id="rId6"/>
+    <p:sldId id="263" r:id="rId7"/>
+    <p:sldId id="262" r:id="rId8"/>
+    <p:sldId id="269" r:id="rId9"/>
+    <p:sldId id="268" r:id="rId10"/>
+    <p:sldId id="264" r:id="rId11"/>
+    <p:sldId id="266" r:id="rId12"/>
+    <p:sldId id="267" r:id="rId13"/>
+    <p:sldId id="270" r:id="rId14"/>
   </p:sldIdLst>
   <p:sldSz cx="12192000" cy="6858000"/>
   <p:notesSz cx="6858000" cy="9144000"/>
@@ -366,7 +376,7 @@
           <a:p>
             <a:fld id="{9184DA70-C731-4C70-880D-CCD4705E623C}" type="datetime1">
               <a:rPr lang="en-US" smtClean="0"/>
-              <a:t>2/29/2020</a:t>
+              <a:t>3/2/20</a:t>
             </a:fld>
             <a:endParaRPr lang="en-US" dirty="0"/>
           </a:p>
@@ -554,7 +564,7 @@
           <a:p>
             <a:fld id="{B612A279-0833-481D-8C56-F67FD0AC6C50}" type="datetime1">
               <a:rPr lang="en-US" smtClean="0"/>
-              <a:t>2/29/2020</a:t>
+              <a:t>3/2/20</a:t>
             </a:fld>
             <a:endParaRPr lang="en-US" dirty="0"/>
           </a:p>
@@ -796,7 +806,7 @@
           <a:p>
             <a:fld id="{6587DA83-5663-4C9C-B9AA-0B40A3DAFF81}" type="datetime1">
               <a:rPr lang="en-US" smtClean="0"/>
-              <a:t>2/29/2020</a:t>
+              <a:t>3/2/20</a:t>
             </a:fld>
             <a:endParaRPr lang="en-US" dirty="0"/>
           </a:p>
@@ -984,7 +994,7 @@
           <a:p>
             <a:fld id="{4BE1D723-8F53-4F53-90B0-1982A396982E}" type="datetime1">
               <a:rPr lang="en-US" smtClean="0"/>
-              <a:t>2/29/2020</a:t>
+              <a:t>3/2/20</a:t>
             </a:fld>
             <a:endParaRPr lang="en-US" dirty="0"/>
           </a:p>
@@ -1357,7 +1367,7 @@
           <a:p>
             <a:fld id="{97669AF7-7BEB-44E4-9852-375E34362B5B}" type="datetime1">
               <a:rPr lang="en-US" smtClean="0"/>
-              <a:t>2/29/2020</a:t>
+              <a:t>3/2/20</a:t>
             </a:fld>
             <a:endParaRPr lang="en-US" dirty="0"/>
           </a:p>
@@ -1612,7 +1622,7 @@
           <a:p>
             <a:fld id="{BAAAC38D-0552-4C82-B593-E6124DFADBE2}" type="datetime1">
               <a:rPr lang="en-US" smtClean="0"/>
-              <a:t>2/29/2020</a:t>
+              <a:t>3/2/20</a:t>
             </a:fld>
             <a:endParaRPr lang="en-US" dirty="0"/>
           </a:p>
@@ -2009,7 +2019,7 @@
           <a:p>
             <a:fld id="{D9DF0F1C-5577-4ACB-BB62-DF8F3C494C7E}" type="datetime1">
               <a:rPr lang="en-US" smtClean="0"/>
-              <a:t>2/29/2020</a:t>
+              <a:t>3/2/20</a:t>
             </a:fld>
             <a:endParaRPr lang="en-US" dirty="0"/>
           </a:p>
@@ -2145,7 +2155,7 @@
           <a:p>
             <a:fld id="{1775B394-D9F9-4F0C-B15D-605F45CB9E9F}" type="datetime1">
               <a:rPr lang="en-US" smtClean="0"/>
-              <a:t>2/29/2020</a:t>
+              <a:t>3/2/20</a:t>
             </a:fld>
             <a:endParaRPr lang="en-US" dirty="0"/>
           </a:p>
@@ -2302,7 +2312,7 @@
           <a:p>
             <a:fld id="{39667345-2558-425A-8533-9BFDBCE15005}" type="datetime1">
               <a:rPr lang="en-US" smtClean="0"/>
-              <a:t>2/29/2020</a:t>
+              <a:t>3/2/20</a:t>
             </a:fld>
             <a:endParaRPr lang="en-US" dirty="0"/>
           </a:p>
@@ -2631,7 +2641,7 @@
           <a:p>
             <a:fld id="{92BEA474-078D-4E9B-9B14-09A87B19DC46}" type="datetime1">
               <a:rPr lang="en-US" smtClean="0"/>
-              <a:t>2/29/2020</a:t>
+              <a:t>3/2/20</a:t>
             </a:fld>
             <a:endParaRPr lang="en-US" dirty="0"/>
           </a:p>
@@ -2981,7 +2991,7 @@
           <a:p>
             <a:fld id="{4907D986-8816-4272-A432-0437A28A9828}" type="datetime1">
               <a:rPr lang="en-US" smtClean="0"/>
-              <a:t>2/29/2020</a:t>
+              <a:t>3/2/20</a:t>
             </a:fld>
             <a:endParaRPr lang="en-US" dirty="0"/>
           </a:p>
@@ -3242,7 +3252,7 @@
           <a:p>
             <a:fld id="{62D6E202-B606-4609-B914-27C9371A1F6D}" type="datetime1">
               <a:rPr lang="en-US" smtClean="0"/>
-              <a:t>2/29/2020</a:t>
+              <a:t>3/2/20</a:t>
             </a:fld>
             <a:endParaRPr lang="en-US" dirty="0"/>
           </a:p>
@@ -4021,6 +4031,614 @@
 </p:sld>
 </file>
 
+<file path=ppt/slides/slide10.xml><?xml version="1.0" encoding="utf-8"?>
+<p:sld xmlns:a="http://schemas.openxmlformats.org/drawingml/2006/main" xmlns:r="http://schemas.openxmlformats.org/officeDocument/2006/relationships" xmlns:p="http://schemas.openxmlformats.org/presentationml/2006/main">
+  <p:cSld>
+    <p:spTree>
+      <p:nvGrpSpPr>
+        <p:cNvPr id="1" name=""/>
+        <p:cNvGrpSpPr/>
+        <p:nvPr/>
+      </p:nvGrpSpPr>
+      <p:grpSpPr>
+        <a:xfrm>
+          <a:off x="0" y="0"/>
+          <a:ext cx="0" cy="0"/>
+          <a:chOff x="0" y="0"/>
+          <a:chExt cx="0" cy="0"/>
+        </a:xfrm>
+      </p:grpSpPr>
+      <p:pic>
+        <p:nvPicPr>
+          <p:cNvPr id="10" name="Picture 9">
+            <a:extLst>
+              <a:ext uri="{FF2B5EF4-FFF2-40B4-BE49-F238E27FC236}">
+                <a16:creationId xmlns:a16="http://schemas.microsoft.com/office/drawing/2014/main" id="{A5DF3E3E-C856-4741-9030-B9C2BBBF00E1}"/>
+              </a:ext>
+            </a:extLst>
+          </p:cNvPr>
+          <p:cNvPicPr>
+            <a:picLocks noChangeAspect="1"/>
+          </p:cNvPicPr>
+          <p:nvPr/>
+        </p:nvPicPr>
+        <p:blipFill>
+          <a:blip r:embed="rId2"/>
+          <a:stretch>
+            <a:fillRect/>
+          </a:stretch>
+        </p:blipFill>
+        <p:spPr>
+          <a:xfrm>
+            <a:off x="3168650" y="406400"/>
+            <a:ext cx="5854700" cy="5702300"/>
+          </a:xfrm>
+          <a:prstGeom prst="rect">
+            <a:avLst/>
+          </a:prstGeom>
+        </p:spPr>
+      </p:pic>
+    </p:spTree>
+    <p:extLst>
+      <p:ext uri="{BB962C8B-B14F-4D97-AF65-F5344CB8AC3E}">
+        <p14:creationId xmlns:p14="http://schemas.microsoft.com/office/powerpoint/2010/main" val="4184916523"/>
+      </p:ext>
+    </p:extLst>
+  </p:cSld>
+  <p:clrMapOvr>
+    <a:masterClrMapping/>
+  </p:clrMapOvr>
+</p:sld>
+</file>
+
+<file path=ppt/slides/slide11.xml><?xml version="1.0" encoding="utf-8"?>
+<p:sld xmlns:a="http://schemas.openxmlformats.org/drawingml/2006/main" xmlns:r="http://schemas.openxmlformats.org/officeDocument/2006/relationships" xmlns:p="http://schemas.openxmlformats.org/presentationml/2006/main">
+  <p:cSld>
+    <p:spTree>
+      <p:nvGrpSpPr>
+        <p:cNvPr id="1" name=""/>
+        <p:cNvGrpSpPr/>
+        <p:nvPr/>
+      </p:nvGrpSpPr>
+      <p:grpSpPr>
+        <a:xfrm>
+          <a:off x="0" y="0"/>
+          <a:ext cx="0" cy="0"/>
+          <a:chOff x="0" y="0"/>
+          <a:chExt cx="0" cy="0"/>
+        </a:xfrm>
+      </p:grpSpPr>
+      <p:sp>
+        <p:nvSpPr>
+          <p:cNvPr id="8" name="Rectangle 7">
+            <a:extLst>
+              <a:ext uri="{FF2B5EF4-FFF2-40B4-BE49-F238E27FC236}">
+                <a16:creationId xmlns:a16="http://schemas.microsoft.com/office/drawing/2014/main" id="{3FCCA7F6-4E42-724E-9C71-5BE6C5558079}"/>
+              </a:ext>
+            </a:extLst>
+          </p:cNvPr>
+          <p:cNvSpPr/>
+          <p:nvPr/>
+        </p:nvSpPr>
+        <p:spPr>
+          <a:xfrm>
+            <a:off x="0" y="0"/>
+            <a:ext cx="12192000" cy="4903453"/>
+          </a:xfrm>
+          <a:prstGeom prst="rect">
+            <a:avLst/>
+          </a:prstGeom>
+          <a:solidFill>
+            <a:schemeClr val="accent1">
+              <a:lumMod val="60000"/>
+              <a:lumOff val="40000"/>
+            </a:schemeClr>
+          </a:solidFill>
+        </p:spPr>
+        <p:style>
+          <a:lnRef idx="2">
+            <a:schemeClr val="accent1">
+              <a:shade val="50000"/>
+            </a:schemeClr>
+          </a:lnRef>
+          <a:fillRef idx="1">
+            <a:schemeClr val="accent1"/>
+          </a:fillRef>
+          <a:effectRef idx="0">
+            <a:schemeClr val="accent1"/>
+          </a:effectRef>
+          <a:fontRef idx="minor">
+            <a:schemeClr val="lt1"/>
+          </a:fontRef>
+        </p:style>
+        <p:txBody>
+          <a:bodyPr rtlCol="0" anchor="ctr"/>
+          <a:lstStyle/>
+          <a:p>
+            <a:pPr algn="ctr"/>
+            <a:endParaRPr lang="en-US"/>
+          </a:p>
+        </p:txBody>
+      </p:sp>
+      <p:sp>
+        <p:nvSpPr>
+          <p:cNvPr id="3" name="Title 2">
+            <a:extLst>
+              <a:ext uri="{FF2B5EF4-FFF2-40B4-BE49-F238E27FC236}">
+                <a16:creationId xmlns:a16="http://schemas.microsoft.com/office/drawing/2014/main" id="{6BE0F994-C4E0-B747-885D-B24CA8C7D70B}"/>
+              </a:ext>
+            </a:extLst>
+          </p:cNvPr>
+          <p:cNvSpPr>
+            <a:spLocks noGrp="1"/>
+          </p:cNvSpPr>
+          <p:nvPr>
+            <p:ph type="title"/>
+          </p:nvPr>
+        </p:nvSpPr>
+        <p:spPr>
+          <a:xfrm>
+            <a:off x="447675" y="4783882"/>
+            <a:ext cx="10113645" cy="743682"/>
+          </a:xfrm>
+        </p:spPr>
+        <p:txBody>
+          <a:bodyPr/>
+          <a:lstStyle/>
+          <a:p>
+            <a:r>
+              <a:rPr lang="en-CA" dirty="0"/>
+              <a:t>Multinomial logistic regression</a:t>
+            </a:r>
+            <a:endParaRPr lang="en-US" dirty="0"/>
+          </a:p>
+        </p:txBody>
+      </p:sp>
+      <p:sp>
+        <p:nvSpPr>
+          <p:cNvPr id="4" name="Text Placeholder 3">
+            <a:extLst>
+              <a:ext uri="{FF2B5EF4-FFF2-40B4-BE49-F238E27FC236}">
+                <a16:creationId xmlns:a16="http://schemas.microsoft.com/office/drawing/2014/main" id="{3D32C07B-390C-0E41-8348-87C1D1864AE9}"/>
+              </a:ext>
+            </a:extLst>
+          </p:cNvPr>
+          <p:cNvSpPr>
+            <a:spLocks noGrp="1"/>
+          </p:cNvSpPr>
+          <p:nvPr>
+            <p:ph type="body" sz="half" idx="2"/>
+          </p:nvPr>
+        </p:nvSpPr>
+        <p:spPr>
+          <a:xfrm>
+            <a:off x="738464" y="5592952"/>
+            <a:ext cx="10113264" cy="413653"/>
+          </a:xfrm>
+        </p:spPr>
+        <p:txBody>
+          <a:bodyPr/>
+          <a:lstStyle/>
+          <a:p>
+            <a:r>
+              <a:rPr lang="en-US" dirty="0">
+                <a:latin typeface="Georgia" panose="02040502050405020303" pitchFamily="18" charset="0"/>
+              </a:rPr>
+              <a:t>Extends logistic regression to multiple classes in the target.</a:t>
+            </a:r>
+          </a:p>
+        </p:txBody>
+      </p:sp>
+      <p:sp>
+        <p:nvSpPr>
+          <p:cNvPr id="5" name="Title 1">
+            <a:extLst>
+              <a:ext uri="{FF2B5EF4-FFF2-40B4-BE49-F238E27FC236}">
+                <a16:creationId xmlns:a16="http://schemas.microsoft.com/office/drawing/2014/main" id="{254A8102-9C1D-4B42-88F0-62CB84233842}"/>
+              </a:ext>
+            </a:extLst>
+          </p:cNvPr>
+          <p:cNvSpPr txBox="1">
+            <a:spLocks/>
+          </p:cNvSpPr>
+          <p:nvPr/>
+        </p:nvSpPr>
+        <p:spPr>
+          <a:xfrm>
+            <a:off x="447675" y="302878"/>
+            <a:ext cx="10058400" cy="1450757"/>
+          </a:xfrm>
+          <a:prstGeom prst="rect">
+            <a:avLst/>
+          </a:prstGeom>
+        </p:spPr>
+        <p:txBody>
+          <a:bodyPr/>
+          <a:lstStyle>
+            <a:lvl1pPr algn="l" defTabSz="914400" rtl="0" eaLnBrk="1" latinLnBrk="0" hangingPunct="1">
+              <a:lnSpc>
+                <a:spcPct val="90000"/>
+              </a:lnSpc>
+              <a:spcBef>
+                <a:spcPct val="0"/>
+              </a:spcBef>
+              <a:buNone/>
+              <a:defRPr sz="4700" i="0" kern="1200" spc="-50" baseline="0">
+                <a:solidFill>
+                  <a:schemeClr val="tx1">
+                    <a:lumMod val="75000"/>
+                    <a:lumOff val="25000"/>
+                  </a:schemeClr>
+                </a:solidFill>
+                <a:latin typeface="+mj-lt"/>
+                <a:ea typeface="+mj-ea"/>
+                <a:cs typeface="+mj-cs"/>
+              </a:defRPr>
+            </a:lvl1pPr>
+          </a:lstStyle>
+          <a:p>
+            <a:r>
+              <a:rPr lang="en-US" dirty="0"/>
+              <a:t>Initial Data Filtering</a:t>
+            </a:r>
+          </a:p>
+        </p:txBody>
+      </p:sp>
+      <p:pic>
+        <p:nvPicPr>
+          <p:cNvPr id="6" name="Picture 5" descr="A screenshot of a cell phone&#10;&#10;Description automatically generated">
+            <a:extLst>
+              <a:ext uri="{FF2B5EF4-FFF2-40B4-BE49-F238E27FC236}">
+                <a16:creationId xmlns:a16="http://schemas.microsoft.com/office/drawing/2014/main" id="{75CCA0CB-B28B-0A40-8E43-A440F535B94E}"/>
+              </a:ext>
+            </a:extLst>
+          </p:cNvPr>
+          <p:cNvPicPr>
+            <a:picLocks noChangeAspect="1"/>
+          </p:cNvPicPr>
+          <p:nvPr/>
+        </p:nvPicPr>
+        <p:blipFill>
+          <a:blip r:embed="rId2">
+            <a:extLst>
+              <a:ext uri="{28A0092B-C50C-407E-A947-70E740481C1C}">
+                <a14:useLocalDpi xmlns:a14="http://schemas.microsoft.com/office/drawing/2010/main" val="0"/>
+              </a:ext>
+            </a:extLst>
+          </a:blip>
+          <a:stretch>
+            <a:fillRect/>
+          </a:stretch>
+        </p:blipFill>
+        <p:spPr>
+          <a:xfrm>
+            <a:off x="988975" y="1154290"/>
+            <a:ext cx="10214049" cy="3525559"/>
+          </a:xfrm>
+          <a:prstGeom prst="rect">
+            <a:avLst/>
+          </a:prstGeom>
+        </p:spPr>
+      </p:pic>
+    </p:spTree>
+    <p:extLst>
+      <p:ext uri="{BB962C8B-B14F-4D97-AF65-F5344CB8AC3E}">
+        <p14:creationId xmlns:p14="http://schemas.microsoft.com/office/powerpoint/2010/main" val="909561943"/>
+      </p:ext>
+    </p:extLst>
+  </p:cSld>
+  <p:clrMapOvr>
+    <a:masterClrMapping/>
+  </p:clrMapOvr>
+</p:sld>
+</file>
+
+<file path=ppt/slides/slide12.xml><?xml version="1.0" encoding="utf-8"?>
+<p:sld xmlns:a="http://schemas.openxmlformats.org/drawingml/2006/main" xmlns:r="http://schemas.openxmlformats.org/officeDocument/2006/relationships" xmlns:p="http://schemas.openxmlformats.org/presentationml/2006/main">
+  <p:cSld>
+    <p:spTree>
+      <p:nvGrpSpPr>
+        <p:cNvPr id="1" name=""/>
+        <p:cNvGrpSpPr/>
+        <p:nvPr/>
+      </p:nvGrpSpPr>
+      <p:grpSpPr>
+        <a:xfrm>
+          <a:off x="0" y="0"/>
+          <a:ext cx="0" cy="0"/>
+          <a:chOff x="0" y="0"/>
+          <a:chExt cx="0" cy="0"/>
+        </a:xfrm>
+      </p:grpSpPr>
+      <p:pic>
+        <p:nvPicPr>
+          <p:cNvPr id="7" name="Picture 6">
+            <a:extLst>
+              <a:ext uri="{FF2B5EF4-FFF2-40B4-BE49-F238E27FC236}">
+                <a16:creationId xmlns:a16="http://schemas.microsoft.com/office/drawing/2014/main" id="{28935286-7C49-9F40-8AB0-AC396601BD70}"/>
+              </a:ext>
+            </a:extLst>
+          </p:cNvPr>
+          <p:cNvPicPr>
+            <a:picLocks noChangeAspect="1"/>
+          </p:cNvPicPr>
+          <p:nvPr/>
+        </p:nvPicPr>
+        <p:blipFill>
+          <a:blip r:embed="rId2"/>
+          <a:stretch>
+            <a:fillRect/>
+          </a:stretch>
+        </p:blipFill>
+        <p:spPr>
+          <a:xfrm>
+            <a:off x="3403600" y="215901"/>
+            <a:ext cx="5384800" cy="6029618"/>
+          </a:xfrm>
+          <a:prstGeom prst="rect">
+            <a:avLst/>
+          </a:prstGeom>
+        </p:spPr>
+      </p:pic>
+    </p:spTree>
+    <p:extLst>
+      <p:ext uri="{BB962C8B-B14F-4D97-AF65-F5344CB8AC3E}">
+        <p14:creationId xmlns:p14="http://schemas.microsoft.com/office/powerpoint/2010/main" val="1405744252"/>
+      </p:ext>
+    </p:extLst>
+  </p:cSld>
+  <p:clrMapOvr>
+    <a:masterClrMapping/>
+  </p:clrMapOvr>
+</p:sld>
+</file>
+
+<file path=ppt/slides/slide13.xml><?xml version="1.0" encoding="utf-8"?>
+<p:sld xmlns:a="http://schemas.openxmlformats.org/drawingml/2006/main" xmlns:r="http://schemas.openxmlformats.org/officeDocument/2006/relationships" xmlns:p="http://schemas.openxmlformats.org/presentationml/2006/main">
+  <p:cSld>
+    <p:spTree>
+      <p:nvGrpSpPr>
+        <p:cNvPr id="1" name=""/>
+        <p:cNvGrpSpPr/>
+        <p:nvPr/>
+      </p:nvGrpSpPr>
+      <p:grpSpPr>
+        <a:xfrm>
+          <a:off x="0" y="0"/>
+          <a:ext cx="0" cy="0"/>
+          <a:chOff x="0" y="0"/>
+          <a:chExt cx="0" cy="0"/>
+        </a:xfrm>
+      </p:grpSpPr>
+      <p:sp>
+        <p:nvSpPr>
+          <p:cNvPr id="2" name="Title 1">
+            <a:extLst>
+              <a:ext uri="{FF2B5EF4-FFF2-40B4-BE49-F238E27FC236}">
+                <a16:creationId xmlns:a16="http://schemas.microsoft.com/office/drawing/2014/main" id="{D906BF61-408A-CE47-995A-669F9B71C978}"/>
+              </a:ext>
+            </a:extLst>
+          </p:cNvPr>
+          <p:cNvSpPr>
+            <a:spLocks noGrp="1"/>
+          </p:cNvSpPr>
+          <p:nvPr>
+            <p:ph type="title"/>
+          </p:nvPr>
+        </p:nvSpPr>
+        <p:spPr>
+          <a:xfrm>
+            <a:off x="504570" y="873015"/>
+            <a:ext cx="3524505" cy="2555986"/>
+          </a:xfrm>
+        </p:spPr>
+        <p:txBody>
+          <a:bodyPr>
+            <a:noAutofit/>
+          </a:bodyPr>
+          <a:lstStyle/>
+          <a:p>
+            <a:r>
+              <a:rPr lang="en-US" sz="4500" dirty="0"/>
+              <a:t>Can we predict you by your responses?</a:t>
+            </a:r>
+          </a:p>
+        </p:txBody>
+      </p:sp>
+      <p:sp>
+        <p:nvSpPr>
+          <p:cNvPr id="3" name="Content Placeholder 2">
+            <a:extLst>
+              <a:ext uri="{FF2B5EF4-FFF2-40B4-BE49-F238E27FC236}">
+                <a16:creationId xmlns:a16="http://schemas.microsoft.com/office/drawing/2014/main" id="{98289849-AFE3-9E45-A0EF-DD53E54F8085}"/>
+              </a:ext>
+            </a:extLst>
+          </p:cNvPr>
+          <p:cNvSpPr>
+            <a:spLocks noGrp="1"/>
+          </p:cNvSpPr>
+          <p:nvPr>
+            <p:ph idx="1"/>
+          </p:nvPr>
+        </p:nvSpPr>
+        <p:spPr>
+          <a:xfrm>
+            <a:off x="5609454" y="995587"/>
+            <a:ext cx="5928344" cy="4866825"/>
+          </a:xfrm>
+        </p:spPr>
+        <p:txBody>
+          <a:bodyPr>
+            <a:noAutofit/>
+          </a:bodyPr>
+          <a:lstStyle/>
+          <a:p>
+            <a:r>
+              <a:rPr lang="en-CA" sz="3400" dirty="0">
+                <a:latin typeface="Georgia" panose="02040502050405020303" pitchFamily="18" charset="0"/>
+              </a:rPr>
+              <a:t>Recognizing that we are using a dataset from </a:t>
+            </a:r>
+            <a:r>
+              <a:rPr lang="en-US" altLang="en-US" sz="3600" dirty="0">
+                <a:latin typeface="Georgia" panose="02040502050405020303" pitchFamily="18" charset="0"/>
+              </a:rPr>
+              <a:t>a Slovakian university with participants between the ages of </a:t>
+            </a:r>
+            <a:r>
+              <a:rPr lang="en-US" altLang="en-US" sz="3600" b="1" dirty="0">
+                <a:latin typeface="Georgia" panose="02040502050405020303" pitchFamily="18" charset="0"/>
+              </a:rPr>
+              <a:t>15-30</a:t>
+            </a:r>
+            <a:r>
+              <a:rPr lang="en-US" altLang="en-US" sz="3600" dirty="0">
+                <a:latin typeface="Georgia" panose="02040502050405020303" pitchFamily="18" charset="0"/>
+              </a:rPr>
+              <a:t>.</a:t>
+            </a:r>
+          </a:p>
+          <a:p>
+            <a:endParaRPr lang="en-US" sz="3600" dirty="0">
+              <a:latin typeface="Georgia" panose="02040502050405020303" pitchFamily="18" charset="0"/>
+            </a:endParaRPr>
+          </a:p>
+          <a:p>
+            <a:r>
+              <a:rPr lang="en-US" sz="3600" dirty="0">
+                <a:latin typeface="Georgia" panose="02040502050405020303" pitchFamily="18" charset="0"/>
+              </a:rPr>
+              <a:t>Let's find out!</a:t>
+            </a:r>
+            <a:endParaRPr lang="en-CA" sz="3400" dirty="0">
+              <a:latin typeface="Georgia" panose="02040502050405020303" pitchFamily="18" charset="0"/>
+            </a:endParaRPr>
+          </a:p>
+        </p:txBody>
+      </p:sp>
+    </p:spTree>
+    <p:extLst>
+      <p:ext uri="{BB962C8B-B14F-4D97-AF65-F5344CB8AC3E}">
+        <p14:creationId xmlns:p14="http://schemas.microsoft.com/office/powerpoint/2010/main" val="759233121"/>
+      </p:ext>
+    </p:extLst>
+  </p:cSld>
+  <p:clrMapOvr>
+    <a:masterClrMapping/>
+  </p:clrMapOvr>
+  <p:timing>
+    <p:tnLst>
+      <p:par>
+        <p:cTn id="1" dur="indefinite" restart="never" nodeType="tmRoot">
+          <p:childTnLst>
+            <p:seq concurrent="1" nextAc="seek">
+              <p:cTn id="2" dur="indefinite" nodeType="mainSeq">
+                <p:childTnLst>
+                  <p:par>
+                    <p:cTn id="3" fill="hold">
+                      <p:stCondLst>
+                        <p:cond delay="indefinite"/>
+                      </p:stCondLst>
+                      <p:childTnLst>
+                        <p:par>
+                          <p:cTn id="4" fill="hold">
+                            <p:stCondLst>
+                              <p:cond delay="0"/>
+                            </p:stCondLst>
+                            <p:childTnLst>
+                              <p:par>
+                                <p:cTn id="5" presetID="1" presetClass="entr" presetSubtype="0" fill="hold" nodeType="clickEffect">
+                                  <p:stCondLst>
+                                    <p:cond delay="0"/>
+                                  </p:stCondLst>
+                                  <p:childTnLst>
+                                    <p:set>
+                                      <p:cBhvr>
+                                        <p:cTn id="6" dur="1" fill="hold">
+                                          <p:stCondLst>
+                                            <p:cond delay="0"/>
+                                          </p:stCondLst>
+                                        </p:cTn>
+                                        <p:tgtEl>
+                                          <p:spTgt spid="3">
+                                            <p:txEl>
+                                              <p:pRg st="0" end="0"/>
+                                            </p:txEl>
+                                          </p:spTgt>
+                                        </p:tgtEl>
+                                        <p:attrNameLst>
+                                          <p:attrName>style.visibility</p:attrName>
+                                        </p:attrNameLst>
+                                      </p:cBhvr>
+                                      <p:to>
+                                        <p:strVal val="visible"/>
+                                      </p:to>
+                                    </p:set>
+                                  </p:childTnLst>
+                                </p:cTn>
+                              </p:par>
+                              <p:par>
+                                <p:cTn id="7" presetID="1" presetClass="entr" presetSubtype="0" fill="hold" nodeType="withEffect">
+                                  <p:stCondLst>
+                                    <p:cond delay="0"/>
+                                  </p:stCondLst>
+                                  <p:childTnLst>
+                                    <p:set>
+                                      <p:cBhvr>
+                                        <p:cTn id="8" dur="1" fill="hold">
+                                          <p:stCondLst>
+                                            <p:cond delay="0"/>
+                                          </p:stCondLst>
+                                        </p:cTn>
+                                        <p:tgtEl>
+                                          <p:spTgt spid="3">
+                                            <p:txEl>
+                                              <p:pRg st="2" end="2"/>
+                                            </p:txEl>
+                                          </p:spTgt>
+                                        </p:tgtEl>
+                                        <p:attrNameLst>
+                                          <p:attrName>style.visibility</p:attrName>
+                                        </p:attrNameLst>
+                                      </p:cBhvr>
+                                      <p:to>
+                                        <p:strVal val="visible"/>
+                                      </p:to>
+                                    </p:set>
+                                  </p:childTnLst>
+                                </p:cTn>
+                              </p:par>
+                            </p:childTnLst>
+                          </p:cTn>
+                        </p:par>
+                      </p:childTnLst>
+                    </p:cTn>
+                  </p:par>
+                </p:childTnLst>
+              </p:cTn>
+              <p:prevCondLst>
+                <p:cond evt="onPrev" delay="0">
+                  <p:tgtEl>
+                    <p:sldTgt/>
+                  </p:tgtEl>
+                </p:cond>
+              </p:prevCondLst>
+              <p:nextCondLst>
+                <p:cond evt="onNext" delay="0">
+                  <p:tgtEl>
+                    <p:sldTgt/>
+                  </p:tgtEl>
+                </p:cond>
+              </p:nextCondLst>
+            </p:seq>
+          </p:childTnLst>
+        </p:cTn>
+      </p:par>
+    </p:tnLst>
+  </p:timing>
+</p:sld>
+</file>
+
 <file path=ppt/slides/slide2.xml><?xml version="1.0" encoding="utf-8"?>
 <p:sld xmlns:a="http://schemas.openxmlformats.org/drawingml/2006/main" xmlns:r="http://schemas.openxmlformats.org/officeDocument/2006/relationships" xmlns:p="http://schemas.openxmlformats.org/presentationml/2006/main">
   <p:cSld>
@@ -4084,40 +4702,17 @@
         </p:nvSpPr>
         <p:spPr bwMode="auto">
           <a:xfrm>
-            <a:off x="1417739" y="2311313"/>
-            <a:ext cx="7382312" cy="3354668"/>
+            <a:off x="1450150" y="1827249"/>
+            <a:ext cx="9844427" cy="2554449"/>
           </a:xfrm>
           <a:prstGeom prst="rect">
             <a:avLst/>
           </a:prstGeom>
-          <a:solidFill>
-            <a:srgbClr val="FFFFFF"/>
-          </a:solidFill>
+          <a:noFill/>
           <a:ln>
             <a:noFill/>
           </a:ln>
           <a:effectLst/>
-          <a:extLst>
-            <a:ext uri="{91240B29-F687-4F45-9708-019B960494DF}">
-              <a14:hiddenLine xmlns:a14="http://schemas.microsoft.com/office/drawing/2010/main" w="9525">
-                <a:solidFill>
-                  <a:schemeClr val="tx1"/>
-                </a:solidFill>
-                <a:miter lim="800000"/>
-                <a:headEnd/>
-                <a:tailEnd/>
-              </a14:hiddenLine>
-            </a:ext>
-            <a:ext uri="{AF507438-7753-43E0-B8FC-AC1667EBCBE1}">
-              <a14:hiddenEffects xmlns:a14="http://schemas.microsoft.com/office/drawing/2010/main">
-                <a:effectLst>
-                  <a:outerShdw dist="35921" dir="2700000" algn="ctr" rotWithShape="0">
-                    <a:schemeClr val="bg2"/>
-                  </a:outerShdw>
-                </a:effectLst>
-              </a14:hiddenEffects>
-            </a:ext>
-          </a:extLst>
         </p:spPr>
         <p:txBody>
           <a:bodyPr vert="horz" wrap="square" lIns="0" tIns="203136" rIns="0" bIns="101568" numCol="1" anchor="ctr" anchorCtr="0" compatLnSpc="1">
@@ -4272,7 +4867,19 @@
               <a:tabLst/>
             </a:pPr>
             <a:r>
-              <a:rPr kumimoji="0" lang="en-US" altLang="en-US" sz="1200" b="0" i="0" u="none" strike="noStrike" cap="none" normalizeH="0" baseline="0" dirty="0">
+              <a:rPr lang="en-US" altLang="en-US" sz="1800" dirty="0">
+                <a:latin typeface="+mn-lt"/>
+              </a:rPr>
+              <a:t>  </a:t>
+            </a:r>
+            <a:r>
+              <a:rPr lang="en-US" altLang="en-US" sz="1800" dirty="0">
+                <a:latin typeface="Georgia" panose="02040502050405020303" pitchFamily="18" charset="0"/>
+              </a:rPr>
+              <a:t>S</a:t>
+            </a:r>
+            <a:r>
+              <a:rPr kumimoji="0" lang="en-US" altLang="en-US" sz="1800" b="0" i="0" u="none" strike="noStrike" cap="none" normalizeH="0" baseline="0" dirty="0">
                 <a:ln>
                   <a:noFill/>
                 </a:ln>
@@ -4280,26 +4887,18 @@
                   <a:schemeClr val="tx1"/>
                 </a:solidFill>
                 <a:effectLst/>
-                <a:latin typeface="+mn-lt"/>
+                <a:latin typeface="Georgia" panose="02040502050405020303" pitchFamily="18" charset="0"/>
               </a:rPr>
-              <a:t>  In 2013, students of the Statistics class at </a:t>
-            </a:r>
-            <a:r>
-              <a:rPr kumimoji="0" lang="en-US" altLang="en-US" sz="1200" b="0" i="0" u="none" strike="noStrike" cap="none" normalizeH="0" baseline="0" dirty="0">
-                <a:ln>
-                  <a:noFill/>
-                </a:ln>
-                <a:solidFill>
-                  <a:srgbClr val="008ABC"/>
-                </a:solidFill>
-                <a:effectLst/>
-                <a:latin typeface="+mn-lt"/>
-                <a:hlinkClick r:id="rId2"/>
+              <a:t>tudents in</a:t>
+            </a:r>
+            <a:r>
+              <a:rPr lang="en-US" altLang="en-US" sz="1800" dirty="0">
+                <a:latin typeface="Georgia" panose="02040502050405020303" pitchFamily="18" charset="0"/>
               </a:rPr>
-              <a:t>FSEV UK</a:t>
-            </a:r>
-            <a:r>
-              <a:rPr kumimoji="0" lang="en-US" altLang="en-US" sz="1200" b="0" i="0" u="none" strike="noStrike" cap="none" normalizeH="0" baseline="0" dirty="0">
+              <a:t> the Social Sciences department of a Slovakian university </a:t>
+            </a:r>
+            <a:r>
+              <a:rPr kumimoji="0" lang="en-US" altLang="en-US" sz="1800" b="0" i="0" u="none" strike="noStrike" cap="none" normalizeH="0" baseline="0" dirty="0">
                 <a:ln>
                   <a:noFill/>
                 </a:ln>
@@ -4307,10 +4906,72 @@
                   <a:schemeClr val="tx1"/>
                 </a:solidFill>
                 <a:effectLst/>
-                <a:latin typeface="+mn-lt"/>
+                <a:latin typeface="Georgia" panose="02040502050405020303" pitchFamily="18" charset="0"/>
               </a:rPr>
-              <a:t> were asked to invite their friends to participate in a survey.</a:t>
-            </a:r>
+              <a:t>were asked to get their friends to participate in a survey in 2013.</a:t>
+            </a:r>
+          </a:p>
+          <a:p>
+            <a:pPr marR="0" lvl="0" algn="l" defTabSz="914400" rtl="0" eaLnBrk="0" fontAlgn="base" latinLnBrk="0" hangingPunct="0">
+              <a:lnSpc>
+                <a:spcPct val="100000"/>
+              </a:lnSpc>
+              <a:spcBef>
+                <a:spcPct val="0"/>
+              </a:spcBef>
+              <a:spcAft>
+                <a:spcPct val="0"/>
+              </a:spcAft>
+              <a:buClrTx/>
+              <a:buSzTx/>
+              <a:buFont typeface="Wingdings" panose="05000000000000000000" pitchFamily="2" charset="2"/>
+              <a:buChar char="q"/>
+              <a:tabLst/>
+            </a:pPr>
+            <a:endParaRPr kumimoji="0" lang="en-US" altLang="en-US" sz="1000" b="0" i="0" u="none" strike="noStrike" cap="none" normalizeH="0" baseline="0" dirty="0">
+              <a:ln>
+                <a:noFill/>
+              </a:ln>
+              <a:solidFill>
+                <a:schemeClr val="tx1"/>
+              </a:solidFill>
+              <a:effectLst/>
+              <a:latin typeface="Georgia" panose="02040502050405020303" pitchFamily="18" charset="0"/>
+            </a:endParaRPr>
+          </a:p>
+          <a:p>
+            <a:pPr lvl="1">
+              <a:buFont typeface="Wingdings" panose="05000000000000000000" pitchFamily="2" charset="2"/>
+              <a:buChar char="q"/>
+            </a:pPr>
+            <a:r>
+              <a:rPr lang="en-US" altLang="en-US" sz="1600" dirty="0">
+                <a:latin typeface="Georgia" panose="02040502050405020303" pitchFamily="18" charset="0"/>
+              </a:rPr>
+              <a:t>  All participants were between the </a:t>
+            </a:r>
+            <a:r>
+              <a:rPr lang="en-US" altLang="en-US" sz="1600" b="1" dirty="0">
+                <a:latin typeface="Georgia" panose="02040502050405020303" pitchFamily="18" charset="0"/>
+              </a:rPr>
+              <a:t>ages of 15-30</a:t>
+            </a:r>
+            <a:r>
+              <a:rPr lang="en-US" altLang="en-US" sz="1600" dirty="0">
+                <a:latin typeface="Georgia" panose="02040502050405020303" pitchFamily="18" charset="0"/>
+              </a:rPr>
+              <a:t>.</a:t>
+            </a:r>
+            <a:endParaRPr kumimoji="0" lang="en-US" altLang="en-US" sz="1600" b="0" i="0" u="none" strike="noStrike" cap="none" normalizeH="0" baseline="0" dirty="0">
+              <a:ln>
+                <a:noFill/>
+              </a:ln>
+              <a:solidFill>
+                <a:schemeClr val="tx1"/>
+              </a:solidFill>
+              <a:effectLst/>
+              <a:latin typeface="Georgia" panose="02040502050405020303" pitchFamily="18" charset="0"/>
+            </a:endParaRPr>
           </a:p>
           <a:p>
             <a:pPr marL="0" marR="0" lvl="0" indent="0" algn="l" defTabSz="914400" rtl="0" eaLnBrk="0" fontAlgn="base" latinLnBrk="0" hangingPunct="0">
@@ -4329,7 +4990,7 @@
               <a:buNone/>
               <a:tabLst/>
             </a:pPr>
-            <a:endParaRPr kumimoji="0" lang="en-US" altLang="en-US" sz="1200" b="0" i="0" u="none" strike="noStrike" cap="none" normalizeH="0" baseline="0" dirty="0">
+            <a:endParaRPr kumimoji="0" lang="en-US" altLang="en-US" sz="1000" b="0" i="0" u="none" strike="noStrike" cap="none" normalizeH="0" baseline="0" dirty="0">
               <a:ln>
                 <a:noFill/>
               </a:ln>
@@ -4337,7 +4998,7 @@
                 <a:schemeClr val="tx1"/>
               </a:solidFill>
               <a:effectLst/>
-              <a:latin typeface="+mn-lt"/>
+              <a:latin typeface="Georgia" panose="02040502050405020303" pitchFamily="18" charset="0"/>
             </a:endParaRPr>
           </a:p>
           <a:p>
@@ -4358,13 +5019,13 @@
               <a:tabLst/>
             </a:pPr>
             <a:r>
-              <a:rPr lang="en-US" altLang="en-US" sz="1200" dirty="0">
-                <a:latin typeface="+mn-lt"/>
+              <a:rPr lang="en-US" altLang="en-US" sz="1800" dirty="0">
+                <a:latin typeface="Georgia" panose="02040502050405020303" pitchFamily="18" charset="0"/>
               </a:rPr>
               <a:t>  </a:t>
             </a:r>
             <a:r>
-              <a:rPr kumimoji="0" lang="en-US" altLang="en-US" sz="1200" b="0" i="0" u="none" strike="noStrike" cap="none" normalizeH="0" baseline="0" dirty="0">
+              <a:rPr kumimoji="0" lang="en-US" altLang="en-US" sz="1800" b="0" i="0" u="none" strike="noStrike" cap="none" normalizeH="0" baseline="0" dirty="0">
                 <a:ln>
                   <a:noFill/>
                 </a:ln>
@@ -4372,37 +5033,16 @@
                   <a:schemeClr val="tx1"/>
                 </a:solidFill>
                 <a:effectLst/>
-                <a:latin typeface="+mn-lt"/>
+                <a:latin typeface="Georgia" panose="02040502050405020303" pitchFamily="18" charset="0"/>
               </a:rPr>
-              <a:t>The data file consists of 1,010 rows and 150 columns (139 integer and 11 categorical).</a:t>
-            </a:r>
-          </a:p>
-          <a:p>
-            <a:pPr marL="0" marR="0" lvl="0" indent="0" algn="l" defTabSz="914400" rtl="0" eaLnBrk="0" fontAlgn="base" latinLnBrk="0" hangingPunct="0">
-              <a:lnSpc>
-                <a:spcPct val="100000"/>
-              </a:lnSpc>
-              <a:spcBef>
-                <a:spcPct val="0"/>
-              </a:spcBef>
-              <a:spcAft>
-                <a:spcPct val="0"/>
-              </a:spcAft>
-              <a:buClrTx/>
-              <a:buSzTx/>
-              <a:buNone/>
-              <a:tabLst/>
-            </a:pPr>
-            <a:endParaRPr kumimoji="0" lang="en-US" altLang="en-US" sz="1200" b="0" i="0" u="none" strike="noStrike" cap="none" normalizeH="0" baseline="0" dirty="0">
-              <a:ln>
-                <a:noFill/>
-              </a:ln>
-              <a:solidFill>
-                <a:schemeClr val="tx1"/>
-              </a:solidFill>
-              <a:effectLst/>
-              <a:latin typeface="+mn-lt"/>
-            </a:endParaRPr>
+              <a:t>The data file consists of 1,010 </a:t>
+            </a:r>
+            <a:r>
+              <a:rPr lang="en-US" altLang="en-US" sz="1800" dirty="0">
+                <a:latin typeface="Georgia" panose="02040502050405020303" pitchFamily="18" charset="0"/>
+              </a:rPr>
+              <a:t>responses.</a:t>
+            </a:r>
           </a:p>
           <a:p>
             <a:pPr marR="0" lvl="0" algn="l" defTabSz="914400" rtl="0" eaLnBrk="0" fontAlgn="base" latinLnBrk="0" hangingPunct="0">
@@ -4421,37 +5061,7 @@
               <a:buChar char="q"/>
               <a:tabLst/>
             </a:pPr>
-            <a:r>
-              <a:rPr kumimoji="0" lang="en-US" altLang="en-US" sz="1200" b="0" i="0" u="none" strike="noStrike" cap="none" normalizeH="0" baseline="0" dirty="0">
-                <a:ln>
-                  <a:noFill/>
-                </a:ln>
-                <a:solidFill>
-                  <a:schemeClr val="tx1"/>
-                </a:solidFill>
-                <a:effectLst/>
-                <a:latin typeface="+mn-lt"/>
-              </a:rPr>
-              <a:t>  The original questionnaire was in Slovak language and was later translated into English.</a:t>
-            </a:r>
-          </a:p>
-          <a:p>
-            <a:pPr marL="0" marR="0" lvl="0" indent="0" algn="l" defTabSz="914400" rtl="0" eaLnBrk="0" fontAlgn="base" latinLnBrk="0" hangingPunct="0">
-              <a:lnSpc>
-                <a:spcPct val="100000"/>
-              </a:lnSpc>
-              <a:spcBef>
-                <a:spcPct val="0"/>
-              </a:spcBef>
-              <a:spcAft>
-                <a:spcPct val="0"/>
-              </a:spcAft>
-              <a:buClrTx/>
-              <a:buSzTx/>
-              <a:buNone/>
-              <a:tabLst/>
-            </a:pPr>
-            <a:endParaRPr kumimoji="0" lang="en-US" altLang="en-US" sz="1200" b="0" i="0" u="none" strike="noStrike" cap="none" normalizeH="0" baseline="0" dirty="0">
+            <a:endParaRPr kumimoji="0" lang="en-US" altLang="en-US" sz="1000" b="0" i="0" u="none" strike="noStrike" cap="none" normalizeH="0" baseline="0" dirty="0">
               <a:ln>
                 <a:noFill/>
               </a:ln>
@@ -4459,7 +5069,7 @@
                 <a:schemeClr val="tx1"/>
               </a:solidFill>
               <a:effectLst/>
-              <a:latin typeface="+mn-lt"/>
+              <a:latin typeface="Georgia" panose="02040502050405020303" pitchFamily="18" charset="0"/>
             </a:endParaRPr>
           </a:p>
           <a:p>
@@ -4480,7 +5090,7 @@
               <a:tabLst/>
             </a:pPr>
             <a:r>
-              <a:rPr kumimoji="0" lang="en-US" altLang="en-US" sz="1200" b="0" i="0" u="none" strike="noStrike" cap="none" normalizeH="0" baseline="0" dirty="0">
+              <a:rPr kumimoji="0" lang="en-US" altLang="en-US" sz="1800" b="0" i="0" u="none" strike="noStrike" cap="none" normalizeH="0" baseline="0" dirty="0">
                 <a:ln>
                   <a:noFill/>
                 </a:ln>
@@ -4488,12 +5098,57 @@
                   <a:schemeClr val="tx1"/>
                 </a:solidFill>
                 <a:effectLst/>
-                <a:latin typeface="+mn-lt"/>
+                <a:latin typeface="Georgia" panose="02040502050405020303" pitchFamily="18" charset="0"/>
               </a:rPr>
-              <a:t>  All participants were of Slovakian </a:t>
-            </a:r>
-            <a:r>
-              <a:rPr kumimoji="0" lang="en-US" altLang="en-US" sz="1200" b="0" i="0" u="none" strike="noStrike" cap="none" normalizeH="0" baseline="0">
+              <a:t>  The original questionnaire was in Slovak language and was later translated into English.</a:t>
+            </a:r>
+          </a:p>
+          <a:p>
+            <a:pPr marL="0" marR="0" lvl="0" indent="0" algn="l" defTabSz="914400" rtl="0" eaLnBrk="0" fontAlgn="base" latinLnBrk="0" hangingPunct="0">
+              <a:lnSpc>
+                <a:spcPct val="100000"/>
+              </a:lnSpc>
+              <a:spcBef>
+                <a:spcPct val="0"/>
+              </a:spcBef>
+              <a:spcAft>
+                <a:spcPct val="0"/>
+              </a:spcAft>
+              <a:buClrTx/>
+              <a:buSzTx/>
+              <a:buNone/>
+              <a:tabLst/>
+            </a:pPr>
+            <a:endParaRPr kumimoji="0" lang="en-US" altLang="en-US" sz="1000" b="0" i="0" u="none" strike="noStrike" cap="none" normalizeH="0" baseline="0" dirty="0">
+              <a:ln>
+                <a:noFill/>
+              </a:ln>
+              <a:solidFill>
+                <a:schemeClr val="tx1"/>
+              </a:solidFill>
+              <a:effectLst/>
+              <a:latin typeface="Georgia" panose="02040502050405020303" pitchFamily="18" charset="0"/>
+            </a:endParaRPr>
+          </a:p>
+          <a:p>
+            <a:pPr marR="0" lvl="0" algn="l" defTabSz="914400" rtl="0" eaLnBrk="0" fontAlgn="base" latinLnBrk="0" hangingPunct="0">
+              <a:lnSpc>
+                <a:spcPct val="100000"/>
+              </a:lnSpc>
+              <a:spcBef>
+                <a:spcPct val="0"/>
+              </a:spcBef>
+              <a:spcAft>
+                <a:spcPct val="0"/>
+              </a:spcAft>
+              <a:buClrTx/>
+              <a:buSzTx/>
+              <a:buFont typeface="Wingdings" panose="05000000000000000000" pitchFamily="2" charset="2"/>
+              <a:buChar char="q"/>
+              <a:tabLst/>
+            </a:pPr>
+            <a:r>
+              <a:rPr kumimoji="0" lang="en-US" altLang="en-US" sz="1800" b="0" i="0" u="none" strike="noStrike" cap="none" normalizeH="0" baseline="0" dirty="0">
                 <a:ln>
                   <a:noFill/>
                 </a:ln>
@@ -4501,12 +5156,946 @@
                   <a:schemeClr val="tx1"/>
                 </a:solidFill>
                 <a:effectLst/>
+                <a:latin typeface="Georgia" panose="02040502050405020303" pitchFamily="18" charset="0"/>
+              </a:rPr>
+              <a:t>  Questions were based on 8 groups:</a:t>
+            </a:r>
+          </a:p>
+        </p:txBody>
+      </p:sp>
+      <p:grpSp>
+        <p:nvGrpSpPr>
+          <p:cNvPr id="7" name="Group 6">
+            <a:extLst>
+              <a:ext uri="{FF2B5EF4-FFF2-40B4-BE49-F238E27FC236}">
+                <a16:creationId xmlns:a16="http://schemas.microsoft.com/office/drawing/2014/main" id="{E59FC5F1-EFEF-9544-8975-85DD36A87E2E}"/>
+              </a:ext>
+            </a:extLst>
+          </p:cNvPr>
+          <p:cNvGrpSpPr/>
+          <p:nvPr/>
+        </p:nvGrpSpPr>
+        <p:grpSpPr>
+          <a:xfrm>
+            <a:off x="1484875" y="4412609"/>
+            <a:ext cx="8920764" cy="1415772"/>
+            <a:chOff x="1473300" y="4500995"/>
+            <a:chExt cx="8920764" cy="1415772"/>
+          </a:xfrm>
+        </p:grpSpPr>
+        <p:sp>
+          <p:nvSpPr>
+            <p:cNvPr id="5" name="TextBox 4">
+              <a:extLst>
+                <a:ext uri="{FF2B5EF4-FFF2-40B4-BE49-F238E27FC236}">
+                  <a16:creationId xmlns:a16="http://schemas.microsoft.com/office/drawing/2014/main" id="{60B60084-FD6D-1444-9A99-9AB1ABC4C945}"/>
+                </a:ext>
+              </a:extLst>
+            </p:cNvPr>
+            <p:cNvSpPr txBox="1"/>
+            <p:nvPr/>
+          </p:nvSpPr>
+          <p:spPr>
+            <a:xfrm>
+              <a:off x="1473300" y="4500995"/>
+              <a:ext cx="3411216" cy="1415772"/>
+            </a:xfrm>
+            <a:prstGeom prst="rect">
+              <a:avLst/>
+            </a:prstGeom>
+            <a:noFill/>
+          </p:spPr>
+          <p:txBody>
+            <a:bodyPr wrap="square" rtlCol="0">
+              <a:spAutoFit/>
+            </a:bodyPr>
+            <a:lstStyle/>
+            <a:p>
+              <a:pPr marL="578358" lvl="1" indent="-285750">
+                <a:buFont typeface="Arial" panose="020B0604020202020204" pitchFamily="34" charset="0"/>
+                <a:buChar char="•"/>
+              </a:pPr>
+              <a:r>
+                <a:rPr lang="en-US" altLang="en-US" sz="1700" dirty="0">
+                  <a:latin typeface="Georgia" panose="02040502050405020303" pitchFamily="18" charset="0"/>
+                </a:rPr>
+                <a:t>Music preferences (19)</a:t>
+              </a:r>
+            </a:p>
+            <a:p>
+              <a:pPr marL="578358" lvl="1" indent="-285750">
+                <a:buFont typeface="Arial" panose="020B0604020202020204" pitchFamily="34" charset="0"/>
+                <a:buChar char="•"/>
+              </a:pPr>
+              <a:endParaRPr lang="en-US" altLang="en-US" sz="500" dirty="0">
+                <a:latin typeface="Georgia" panose="02040502050405020303" pitchFamily="18" charset="0"/>
+              </a:endParaRPr>
+            </a:p>
+            <a:p>
+              <a:pPr marL="578358" lvl="1" indent="-285750">
+                <a:buFont typeface="Arial" panose="020B0604020202020204" pitchFamily="34" charset="0"/>
+                <a:buChar char="•"/>
+              </a:pPr>
+              <a:r>
+                <a:rPr lang="en-US" altLang="en-US" sz="1700" dirty="0">
+                  <a:latin typeface="Georgia" panose="02040502050405020303" pitchFamily="18" charset="0"/>
+                </a:rPr>
+                <a:t>Movie preferences (12)</a:t>
+              </a:r>
+            </a:p>
+            <a:p>
+              <a:pPr marL="578358" lvl="1" indent="-285750">
+                <a:buFont typeface="Arial" panose="020B0604020202020204" pitchFamily="34" charset="0"/>
+                <a:buChar char="•"/>
+              </a:pPr>
+              <a:endParaRPr lang="en-US" altLang="en-US" sz="500" dirty="0">
+                <a:latin typeface="Georgia" panose="02040502050405020303" pitchFamily="18" charset="0"/>
+              </a:endParaRPr>
+            </a:p>
+            <a:p>
+              <a:pPr marL="578358" lvl="1" indent="-285750">
+                <a:buFont typeface="Arial" panose="020B0604020202020204" pitchFamily="34" charset="0"/>
+                <a:buChar char="•"/>
+              </a:pPr>
+              <a:r>
+                <a:rPr lang="en-US" altLang="en-US" sz="1700" dirty="0">
+                  <a:latin typeface="Georgia" panose="02040502050405020303" pitchFamily="18" charset="0"/>
+                </a:rPr>
+                <a:t>Hobbies &amp; interests (32)</a:t>
+              </a:r>
+            </a:p>
+            <a:p>
+              <a:pPr marL="578358" lvl="1" indent="-285750">
+                <a:buFont typeface="Arial" panose="020B0604020202020204" pitchFamily="34" charset="0"/>
+                <a:buChar char="•"/>
+              </a:pPr>
+              <a:endParaRPr lang="en-US" altLang="en-US" sz="500" dirty="0">
+                <a:latin typeface="Georgia" panose="02040502050405020303" pitchFamily="18" charset="0"/>
+              </a:endParaRPr>
+            </a:p>
+            <a:p>
+              <a:pPr marL="578358" lvl="1" indent="-285750">
+                <a:buFont typeface="Arial" panose="020B0604020202020204" pitchFamily="34" charset="0"/>
+                <a:buChar char="•"/>
+              </a:pPr>
+              <a:r>
+                <a:rPr lang="en-US" altLang="en-US" sz="1700" dirty="0">
+                  <a:latin typeface="Georgia" panose="02040502050405020303" pitchFamily="18" charset="0"/>
+                </a:rPr>
+                <a:t>Phobias (10)</a:t>
+              </a:r>
+            </a:p>
+          </p:txBody>
+        </p:sp>
+        <p:sp>
+          <p:nvSpPr>
+            <p:cNvPr id="6" name="TextBox 5">
+              <a:extLst>
+                <a:ext uri="{FF2B5EF4-FFF2-40B4-BE49-F238E27FC236}">
+                  <a16:creationId xmlns:a16="http://schemas.microsoft.com/office/drawing/2014/main" id="{E39405B9-F38B-3D49-9FEC-AF1FC765D271}"/>
+                </a:ext>
+              </a:extLst>
+            </p:cNvPr>
+            <p:cNvSpPr txBox="1"/>
+            <p:nvPr/>
+          </p:nvSpPr>
+          <p:spPr>
+            <a:xfrm>
+              <a:off x="4907661" y="4500995"/>
+              <a:ext cx="5486403" cy="1369606"/>
+            </a:xfrm>
+            <a:prstGeom prst="rect">
+              <a:avLst/>
+            </a:prstGeom>
+            <a:noFill/>
+          </p:spPr>
+          <p:txBody>
+            <a:bodyPr wrap="square" rtlCol="0">
+              <a:spAutoFit/>
+            </a:bodyPr>
+            <a:lstStyle/>
+            <a:p>
+              <a:pPr marL="578358" lvl="1" indent="-285750">
+                <a:buFont typeface="Arial" panose="020B0604020202020204" pitchFamily="34" charset="0"/>
+                <a:buChar char="•"/>
+              </a:pPr>
+              <a:r>
+                <a:rPr lang="en-US" altLang="en-US" sz="1700" dirty="0">
+                  <a:latin typeface="Georgia" panose="02040502050405020303" pitchFamily="18" charset="0"/>
+                </a:rPr>
+                <a:t>Health habits (3)</a:t>
+              </a:r>
+            </a:p>
+            <a:p>
+              <a:pPr marL="578358" lvl="1" indent="-285750">
+                <a:buFont typeface="Arial" panose="020B0604020202020204" pitchFamily="34" charset="0"/>
+                <a:buChar char="•"/>
+              </a:pPr>
+              <a:endParaRPr lang="en-US" altLang="en-US" sz="500" dirty="0">
+                <a:latin typeface="Georgia" panose="02040502050405020303" pitchFamily="18" charset="0"/>
+              </a:endParaRPr>
+            </a:p>
+            <a:p>
+              <a:pPr marL="578358" lvl="1" indent="-285750">
+                <a:buFont typeface="Arial" panose="020B0604020202020204" pitchFamily="34" charset="0"/>
+                <a:buChar char="•"/>
+              </a:pPr>
+              <a:r>
+                <a:rPr lang="en-US" altLang="en-US" sz="1700" dirty="0">
+                  <a:latin typeface="Georgia" panose="02040502050405020303" pitchFamily="18" charset="0"/>
+                </a:rPr>
+                <a:t>Personality traits, views on life, &amp; opinions (57)</a:t>
+              </a:r>
+            </a:p>
+            <a:p>
+              <a:pPr marL="578358" lvl="1" indent="-285750">
+                <a:buFont typeface="Arial" panose="020B0604020202020204" pitchFamily="34" charset="0"/>
+                <a:buChar char="•"/>
+              </a:pPr>
+              <a:endParaRPr lang="en-US" altLang="en-US" sz="500" dirty="0">
+                <a:latin typeface="Georgia" panose="02040502050405020303" pitchFamily="18" charset="0"/>
+              </a:endParaRPr>
+            </a:p>
+            <a:p>
+              <a:pPr marL="578358" lvl="1" indent="-285750">
+                <a:buFont typeface="Arial" panose="020B0604020202020204" pitchFamily="34" charset="0"/>
+                <a:buChar char="•"/>
+              </a:pPr>
+              <a:r>
+                <a:rPr lang="en-US" altLang="en-US" sz="1700" dirty="0">
+                  <a:latin typeface="Georgia" panose="02040502050405020303" pitchFamily="18" charset="0"/>
+                </a:rPr>
+                <a:t>Spending habits (7)</a:t>
+              </a:r>
+            </a:p>
+            <a:p>
+              <a:pPr marL="578358" lvl="1" indent="-285750">
+                <a:buFont typeface="Arial" panose="020B0604020202020204" pitchFamily="34" charset="0"/>
+                <a:buChar char="•"/>
+              </a:pPr>
+              <a:endParaRPr lang="en-US" altLang="en-US" sz="500" dirty="0">
+                <a:latin typeface="Georgia" panose="02040502050405020303" pitchFamily="18" charset="0"/>
+              </a:endParaRPr>
+            </a:p>
+            <a:p>
+              <a:pPr marL="578358" lvl="1" indent="-285750">
+                <a:buFont typeface="Arial" panose="020B0604020202020204" pitchFamily="34" charset="0"/>
+                <a:buChar char="•"/>
+              </a:pPr>
+              <a:r>
+                <a:rPr lang="en-US" altLang="en-US" sz="1700" dirty="0">
+                  <a:latin typeface="Georgia" panose="02040502050405020303" pitchFamily="18" charset="0"/>
+                </a:rPr>
+                <a:t>Demographics (10)</a:t>
+              </a:r>
+            </a:p>
+          </p:txBody>
+        </p:sp>
+      </p:grpSp>
+    </p:spTree>
+    <p:extLst>
+      <p:ext uri="{BB962C8B-B14F-4D97-AF65-F5344CB8AC3E}">
+        <p14:creationId xmlns:p14="http://schemas.microsoft.com/office/powerpoint/2010/main" val="653688861"/>
+      </p:ext>
+    </p:extLst>
+  </p:cSld>
+  <p:clrMapOvr>
+    <a:masterClrMapping/>
+  </p:clrMapOvr>
+  <p:timing>
+    <p:tnLst>
+      <p:par>
+        <p:cTn id="1" dur="indefinite" restart="never" nodeType="tmRoot">
+          <p:childTnLst>
+            <p:seq concurrent="1" nextAc="seek">
+              <p:cTn id="2" dur="indefinite" nodeType="mainSeq">
+                <p:childTnLst>
+                  <p:par>
+                    <p:cTn id="3" fill="hold">
+                      <p:stCondLst>
+                        <p:cond delay="indefinite"/>
+                      </p:stCondLst>
+                      <p:childTnLst>
+                        <p:par>
+                          <p:cTn id="4" fill="hold">
+                            <p:stCondLst>
+                              <p:cond delay="0"/>
+                            </p:stCondLst>
+                            <p:childTnLst>
+                              <p:par>
+                                <p:cTn id="5" presetID="1" presetClass="entr" presetSubtype="0" fill="hold" nodeType="clickEffect">
+                                  <p:stCondLst>
+                                    <p:cond delay="0"/>
+                                  </p:stCondLst>
+                                  <p:childTnLst>
+                                    <p:set>
+                                      <p:cBhvr>
+                                        <p:cTn id="6" dur="1" fill="hold">
+                                          <p:stCondLst>
+                                            <p:cond delay="0"/>
+                                          </p:stCondLst>
+                                        </p:cTn>
+                                        <p:tgtEl>
+                                          <p:spTgt spid="4">
+                                            <p:txEl>
+                                              <p:pRg st="4" end="4"/>
+                                            </p:txEl>
+                                          </p:spTgt>
+                                        </p:tgtEl>
+                                        <p:attrNameLst>
+                                          <p:attrName>style.visibility</p:attrName>
+                                        </p:attrNameLst>
+                                      </p:cBhvr>
+                                      <p:to>
+                                        <p:strVal val="visible"/>
+                                      </p:to>
+                                    </p:set>
+                                  </p:childTnLst>
+                                </p:cTn>
+                              </p:par>
+                            </p:childTnLst>
+                          </p:cTn>
+                        </p:par>
+                      </p:childTnLst>
+                    </p:cTn>
+                  </p:par>
+                  <p:par>
+                    <p:cTn id="7" fill="hold">
+                      <p:stCondLst>
+                        <p:cond delay="indefinite"/>
+                      </p:stCondLst>
+                      <p:childTnLst>
+                        <p:par>
+                          <p:cTn id="8" fill="hold">
+                            <p:stCondLst>
+                              <p:cond delay="0"/>
+                            </p:stCondLst>
+                            <p:childTnLst>
+                              <p:par>
+                                <p:cTn id="9" presetID="1" presetClass="entr" presetSubtype="0" fill="hold" nodeType="clickEffect">
+                                  <p:stCondLst>
+                                    <p:cond delay="0"/>
+                                  </p:stCondLst>
+                                  <p:childTnLst>
+                                    <p:set>
+                                      <p:cBhvr>
+                                        <p:cTn id="10" dur="1" fill="hold">
+                                          <p:stCondLst>
+                                            <p:cond delay="0"/>
+                                          </p:stCondLst>
+                                        </p:cTn>
+                                        <p:tgtEl>
+                                          <p:spTgt spid="4">
+                                            <p:txEl>
+                                              <p:pRg st="6" end="6"/>
+                                            </p:txEl>
+                                          </p:spTgt>
+                                        </p:tgtEl>
+                                        <p:attrNameLst>
+                                          <p:attrName>style.visibility</p:attrName>
+                                        </p:attrNameLst>
+                                      </p:cBhvr>
+                                      <p:to>
+                                        <p:strVal val="visible"/>
+                                      </p:to>
+                                    </p:set>
+                                  </p:childTnLst>
+                                </p:cTn>
+                              </p:par>
+                            </p:childTnLst>
+                          </p:cTn>
+                        </p:par>
+                      </p:childTnLst>
+                    </p:cTn>
+                  </p:par>
+                  <p:par>
+                    <p:cTn id="11" fill="hold">
+                      <p:stCondLst>
+                        <p:cond delay="indefinite"/>
+                      </p:stCondLst>
+                      <p:childTnLst>
+                        <p:par>
+                          <p:cTn id="12" fill="hold">
+                            <p:stCondLst>
+                              <p:cond delay="0"/>
+                            </p:stCondLst>
+                            <p:childTnLst>
+                              <p:par>
+                                <p:cTn id="13" presetID="1" presetClass="entr" presetSubtype="0" fill="hold" nodeType="clickEffect">
+                                  <p:stCondLst>
+                                    <p:cond delay="0"/>
+                                  </p:stCondLst>
+                                  <p:childTnLst>
+                                    <p:set>
+                                      <p:cBhvr>
+                                        <p:cTn id="14" dur="1" fill="hold">
+                                          <p:stCondLst>
+                                            <p:cond delay="0"/>
+                                          </p:stCondLst>
+                                        </p:cTn>
+                                        <p:tgtEl>
+                                          <p:spTgt spid="4">
+                                            <p:txEl>
+                                              <p:pRg st="8" end="8"/>
+                                            </p:txEl>
+                                          </p:spTgt>
+                                        </p:tgtEl>
+                                        <p:attrNameLst>
+                                          <p:attrName>style.visibility</p:attrName>
+                                        </p:attrNameLst>
+                                      </p:cBhvr>
+                                      <p:to>
+                                        <p:strVal val="visible"/>
+                                      </p:to>
+                                    </p:set>
+                                  </p:childTnLst>
+                                </p:cTn>
+                              </p:par>
+                            </p:childTnLst>
+                          </p:cTn>
+                        </p:par>
+                      </p:childTnLst>
+                    </p:cTn>
+                  </p:par>
+                  <p:par>
+                    <p:cTn id="15" fill="hold">
+                      <p:stCondLst>
+                        <p:cond delay="indefinite"/>
+                      </p:stCondLst>
+                      <p:childTnLst>
+                        <p:par>
+                          <p:cTn id="16" fill="hold">
+                            <p:stCondLst>
+                              <p:cond delay="0"/>
+                            </p:stCondLst>
+                            <p:childTnLst>
+                              <p:par>
+                                <p:cTn id="17" presetID="1" presetClass="entr" presetSubtype="0" fill="hold" nodeType="clickEffect">
+                                  <p:stCondLst>
+                                    <p:cond delay="0"/>
+                                  </p:stCondLst>
+                                  <p:childTnLst>
+                                    <p:set>
+                                      <p:cBhvr>
+                                        <p:cTn id="18" dur="1" fill="hold">
+                                          <p:stCondLst>
+                                            <p:cond delay="0"/>
+                                          </p:stCondLst>
+                                        </p:cTn>
+                                        <p:tgtEl>
+                                          <p:spTgt spid="7"/>
+                                        </p:tgtEl>
+                                        <p:attrNameLst>
+                                          <p:attrName>style.visibility</p:attrName>
+                                        </p:attrNameLst>
+                                      </p:cBhvr>
+                                      <p:to>
+                                        <p:strVal val="visible"/>
+                                      </p:to>
+                                    </p:set>
+                                  </p:childTnLst>
+                                </p:cTn>
+                              </p:par>
+                            </p:childTnLst>
+                          </p:cTn>
+                        </p:par>
+                      </p:childTnLst>
+                    </p:cTn>
+                  </p:par>
+                </p:childTnLst>
+              </p:cTn>
+              <p:prevCondLst>
+                <p:cond evt="onPrev" delay="0">
+                  <p:tgtEl>
+                    <p:sldTgt/>
+                  </p:tgtEl>
+                </p:cond>
+              </p:prevCondLst>
+              <p:nextCondLst>
+                <p:cond evt="onNext" delay="0">
+                  <p:tgtEl>
+                    <p:sldTgt/>
+                  </p:tgtEl>
+                </p:cond>
+              </p:nextCondLst>
+            </p:seq>
+          </p:childTnLst>
+        </p:cTn>
+      </p:par>
+    </p:tnLst>
+  </p:timing>
+</p:sld>
+</file>
+
+<file path=ppt/slides/slide3.xml><?xml version="1.0" encoding="utf-8"?>
+<p:sld xmlns:a="http://schemas.openxmlformats.org/drawingml/2006/main" xmlns:r="http://schemas.openxmlformats.org/officeDocument/2006/relationships" xmlns:p="http://schemas.openxmlformats.org/presentationml/2006/main">
+  <p:cSld>
+    <p:spTree>
+      <p:nvGrpSpPr>
+        <p:cNvPr id="1" name=""/>
+        <p:cNvGrpSpPr/>
+        <p:nvPr/>
+      </p:nvGrpSpPr>
+      <p:grpSpPr>
+        <a:xfrm>
+          <a:off x="0" y="0"/>
+          <a:ext cx="0" cy="0"/>
+          <a:chOff x="0" y="0"/>
+          <a:chExt cx="0" cy="0"/>
+        </a:xfrm>
+      </p:grpSpPr>
+      <p:sp>
+        <p:nvSpPr>
+          <p:cNvPr id="2" name="Title 1">
+            <a:extLst>
+              <a:ext uri="{FF2B5EF4-FFF2-40B4-BE49-F238E27FC236}">
+                <a16:creationId xmlns:a16="http://schemas.microsoft.com/office/drawing/2014/main" id="{D906BF61-408A-CE47-995A-669F9B71C978}"/>
+              </a:ext>
+            </a:extLst>
+          </p:cNvPr>
+          <p:cNvSpPr>
+            <a:spLocks noGrp="1"/>
+          </p:cNvSpPr>
+          <p:nvPr>
+            <p:ph type="title"/>
+          </p:nvPr>
+        </p:nvSpPr>
+        <p:spPr>
+          <a:xfrm>
+            <a:off x="475995" y="873014"/>
+            <a:ext cx="3524505" cy="5111969"/>
+          </a:xfrm>
+        </p:spPr>
+        <p:txBody>
+          <a:bodyPr>
+            <a:noAutofit/>
+          </a:bodyPr>
+          <a:lstStyle/>
+          <a:p>
+            <a:r>
+              <a:rPr lang="en-US" sz="4500" dirty="0"/>
+              <a:t>The three of us started playing around with the data to develop questions.</a:t>
+            </a:r>
+          </a:p>
+        </p:txBody>
+      </p:sp>
+      <p:sp>
+        <p:nvSpPr>
+          <p:cNvPr id="3" name="Content Placeholder 2">
+            <a:extLst>
+              <a:ext uri="{FF2B5EF4-FFF2-40B4-BE49-F238E27FC236}">
+                <a16:creationId xmlns:a16="http://schemas.microsoft.com/office/drawing/2014/main" id="{98289849-AFE3-9E45-A0EF-DD53E54F8085}"/>
+              </a:ext>
+            </a:extLst>
+          </p:cNvPr>
+          <p:cNvSpPr>
+            <a:spLocks noGrp="1"/>
+          </p:cNvSpPr>
+          <p:nvPr>
+            <p:ph idx="1"/>
+          </p:nvPr>
+        </p:nvSpPr>
+        <p:spPr>
+          <a:xfrm>
+            <a:off x="5652317" y="873014"/>
+            <a:ext cx="5928344" cy="5290915"/>
+          </a:xfrm>
+        </p:spPr>
+        <p:txBody>
+          <a:bodyPr>
+            <a:noAutofit/>
+          </a:bodyPr>
+          <a:lstStyle/>
+          <a:p>
+            <a:r>
+              <a:rPr lang="en-CA" sz="3400" dirty="0">
+                <a:latin typeface="Georgia" panose="02040502050405020303" pitchFamily="18" charset="0"/>
+              </a:rPr>
+              <a:t>Can we make spurious correlations among seemingly unrelated categories using machine learning? </a:t>
+            </a:r>
+          </a:p>
+          <a:p>
+            <a:endParaRPr lang="en-CA" sz="1000" dirty="0">
+              <a:latin typeface="Georgia" panose="02040502050405020303" pitchFamily="18" charset="0"/>
+            </a:endParaRPr>
+          </a:p>
+          <a:p>
+            <a:r>
+              <a:rPr lang="en-CA" sz="3400" dirty="0">
+                <a:latin typeface="Georgia" panose="02040502050405020303" pitchFamily="18" charset="0"/>
+              </a:rPr>
+              <a:t>Can one category (i.e. personality traits/opinions) predict the response to another (i.e. phobias)?</a:t>
+            </a:r>
+          </a:p>
+        </p:txBody>
+      </p:sp>
+    </p:spTree>
+    <p:extLst>
+      <p:ext uri="{BB962C8B-B14F-4D97-AF65-F5344CB8AC3E}">
+        <p14:creationId xmlns:p14="http://schemas.microsoft.com/office/powerpoint/2010/main" val="1749993997"/>
+      </p:ext>
+    </p:extLst>
+  </p:cSld>
+  <p:clrMapOvr>
+    <a:masterClrMapping/>
+  </p:clrMapOvr>
+  <p:timing>
+    <p:tnLst>
+      <p:par>
+        <p:cTn id="1" dur="indefinite" restart="never" nodeType="tmRoot">
+          <p:childTnLst>
+            <p:seq concurrent="1" nextAc="seek">
+              <p:cTn id="2" dur="indefinite" nodeType="mainSeq">
+                <p:childTnLst>
+                  <p:par>
+                    <p:cTn id="3" fill="hold">
+                      <p:stCondLst>
+                        <p:cond delay="indefinite"/>
+                      </p:stCondLst>
+                      <p:childTnLst>
+                        <p:par>
+                          <p:cTn id="4" fill="hold">
+                            <p:stCondLst>
+                              <p:cond delay="0"/>
+                            </p:stCondLst>
+                            <p:childTnLst>
+                              <p:par>
+                                <p:cTn id="5" presetID="1" presetClass="entr" presetSubtype="0" fill="hold" grpId="0" nodeType="clickEffect">
+                                  <p:stCondLst>
+                                    <p:cond delay="0"/>
+                                  </p:stCondLst>
+                                  <p:childTnLst>
+                                    <p:set>
+                                      <p:cBhvr>
+                                        <p:cTn id="6" dur="1" fill="hold">
+                                          <p:stCondLst>
+                                            <p:cond delay="0"/>
+                                          </p:stCondLst>
+                                        </p:cTn>
+                                        <p:tgtEl>
+                                          <p:spTgt spid="3">
+                                            <p:txEl>
+                                              <p:pRg st="0" end="0"/>
+                                            </p:txEl>
+                                          </p:spTgt>
+                                        </p:tgtEl>
+                                        <p:attrNameLst>
+                                          <p:attrName>style.visibility</p:attrName>
+                                        </p:attrNameLst>
+                                      </p:cBhvr>
+                                      <p:to>
+                                        <p:strVal val="visible"/>
+                                      </p:to>
+                                    </p:set>
+                                  </p:childTnLst>
+                                </p:cTn>
+                              </p:par>
+                              <p:par>
+                                <p:cTn id="7" presetID="1" presetClass="entr" presetSubtype="0" fill="hold" grpId="0" nodeType="withEffect">
+                                  <p:stCondLst>
+                                    <p:cond delay="0"/>
+                                  </p:stCondLst>
+                                  <p:childTnLst>
+                                    <p:set>
+                                      <p:cBhvr>
+                                        <p:cTn id="8" dur="1" fill="hold">
+                                          <p:stCondLst>
+                                            <p:cond delay="0"/>
+                                          </p:stCondLst>
+                                        </p:cTn>
+                                        <p:tgtEl>
+                                          <p:spTgt spid="3">
+                                            <p:txEl>
+                                              <p:pRg st="2" end="2"/>
+                                            </p:txEl>
+                                          </p:spTgt>
+                                        </p:tgtEl>
+                                        <p:attrNameLst>
+                                          <p:attrName>style.visibility</p:attrName>
+                                        </p:attrNameLst>
+                                      </p:cBhvr>
+                                      <p:to>
+                                        <p:strVal val="visible"/>
+                                      </p:to>
+                                    </p:set>
+                                  </p:childTnLst>
+                                </p:cTn>
+                              </p:par>
+                            </p:childTnLst>
+                          </p:cTn>
+                        </p:par>
+                      </p:childTnLst>
+                    </p:cTn>
+                  </p:par>
+                </p:childTnLst>
+              </p:cTn>
+              <p:prevCondLst>
+                <p:cond evt="onPrev" delay="0">
+                  <p:tgtEl>
+                    <p:sldTgt/>
+                  </p:tgtEl>
+                </p:cond>
+              </p:prevCondLst>
+              <p:nextCondLst>
+                <p:cond evt="onNext" delay="0">
+                  <p:tgtEl>
+                    <p:sldTgt/>
+                  </p:tgtEl>
+                </p:cond>
+              </p:nextCondLst>
+            </p:seq>
+          </p:childTnLst>
+        </p:cTn>
+      </p:par>
+    </p:tnLst>
+    <p:bldLst>
+      <p:bldP spid="3" grpId="0" uiExpand="1" build="p"/>
+    </p:bldLst>
+  </p:timing>
+</p:sld>
+</file>
+
+<file path=ppt/slides/slide4.xml><?xml version="1.0" encoding="utf-8"?>
+<p:sld xmlns:a="http://schemas.openxmlformats.org/drawingml/2006/main" xmlns:r="http://schemas.openxmlformats.org/officeDocument/2006/relationships" xmlns:p="http://schemas.openxmlformats.org/presentationml/2006/main">
+  <p:cSld>
+    <p:spTree>
+      <p:nvGrpSpPr>
+        <p:cNvPr id="1" name=""/>
+        <p:cNvGrpSpPr/>
+        <p:nvPr/>
+      </p:nvGrpSpPr>
+      <p:grpSpPr>
+        <a:xfrm>
+          <a:off x="0" y="0"/>
+          <a:ext cx="0" cy="0"/>
+          <a:chOff x="0" y="0"/>
+          <a:chExt cx="0" cy="0"/>
+        </a:xfrm>
+      </p:grpSpPr>
+      <p:sp>
+        <p:nvSpPr>
+          <p:cNvPr id="2" name="Title 1">
+            <a:extLst>
+              <a:ext uri="{FF2B5EF4-FFF2-40B4-BE49-F238E27FC236}">
+                <a16:creationId xmlns:a16="http://schemas.microsoft.com/office/drawing/2014/main" id="{B215BFA3-BA82-4692-A51D-8E1411F38A4F}"/>
+              </a:ext>
+            </a:extLst>
+          </p:cNvPr>
+          <p:cNvSpPr>
+            <a:spLocks noGrp="1"/>
+          </p:cNvSpPr>
+          <p:nvPr>
+            <p:ph type="title"/>
+          </p:nvPr>
+        </p:nvSpPr>
+        <p:spPr/>
+        <p:txBody>
+          <a:bodyPr/>
+          <a:lstStyle/>
+          <a:p>
+            <a:r>
+              <a:rPr lang="en-US" dirty="0"/>
+              <a:t>Young People Survey</a:t>
+            </a:r>
+          </a:p>
+        </p:txBody>
+      </p:sp>
+      <p:sp>
+        <p:nvSpPr>
+          <p:cNvPr id="4" name="Rectangle 1">
+            <a:extLst>
+              <a:ext uri="{FF2B5EF4-FFF2-40B4-BE49-F238E27FC236}">
+                <a16:creationId xmlns:a16="http://schemas.microsoft.com/office/drawing/2014/main" id="{603C97EB-2DAF-400C-AAA8-91A5902660B2}"/>
+              </a:ext>
+            </a:extLst>
+          </p:cNvPr>
+          <p:cNvSpPr>
+            <a:spLocks noGrp="1" noChangeArrowheads="1"/>
+          </p:cNvSpPr>
+          <p:nvPr>
+            <p:ph idx="1"/>
+          </p:nvPr>
+        </p:nvSpPr>
+        <p:spPr bwMode="auto">
+          <a:xfrm>
+            <a:off x="1450150" y="1827249"/>
+            <a:ext cx="9844427" cy="2554449"/>
+          </a:xfrm>
+          <a:prstGeom prst="rect">
+            <a:avLst/>
+          </a:prstGeom>
+          <a:noFill/>
+          <a:ln>
+            <a:noFill/>
+          </a:ln>
+          <a:effectLst/>
+        </p:spPr>
+        <p:txBody>
+          <a:bodyPr vert="horz" wrap="square" lIns="0" tIns="203136" rIns="0" bIns="101568" numCol="1" anchor="ctr" anchorCtr="0" compatLnSpc="1">
+            <a:prstTxWarp prst="textNoShape">
+              <a:avLst/>
+            </a:prstTxWarp>
+            <a:spAutoFit/>
+          </a:bodyPr>
+          <a:lstStyle>
+            <a:lvl1pPr eaLnBrk="0" fontAlgn="base" hangingPunct="0">
+              <a:spcBef>
+                <a:spcPct val="0"/>
+              </a:spcBef>
+              <a:spcAft>
+                <a:spcPct val="0"/>
+              </a:spcAft>
+              <a:defRPr>
+                <a:solidFill>
+                  <a:schemeClr val="tx1"/>
+                </a:solidFill>
+                <a:latin typeface="Arial" panose="020B0604020202020204" pitchFamily="34" charset="0"/>
+              </a:defRPr>
+            </a:lvl1pPr>
+            <a:lvl2pPr eaLnBrk="0" fontAlgn="base" hangingPunct="0">
+              <a:spcBef>
+                <a:spcPct val="0"/>
+              </a:spcBef>
+              <a:spcAft>
+                <a:spcPct val="0"/>
+              </a:spcAft>
+              <a:defRPr>
+                <a:solidFill>
+                  <a:schemeClr val="tx1"/>
+                </a:solidFill>
+                <a:latin typeface="Arial" panose="020B0604020202020204" pitchFamily="34" charset="0"/>
+              </a:defRPr>
+            </a:lvl2pPr>
+            <a:lvl3pPr eaLnBrk="0" fontAlgn="base" hangingPunct="0">
+              <a:spcBef>
+                <a:spcPct val="0"/>
+              </a:spcBef>
+              <a:spcAft>
+                <a:spcPct val="0"/>
+              </a:spcAft>
+              <a:defRPr>
+                <a:solidFill>
+                  <a:schemeClr val="tx1"/>
+                </a:solidFill>
+                <a:latin typeface="Arial" panose="020B0604020202020204" pitchFamily="34" charset="0"/>
+              </a:defRPr>
+            </a:lvl3pPr>
+            <a:lvl4pPr eaLnBrk="0" fontAlgn="base" hangingPunct="0">
+              <a:spcBef>
+                <a:spcPct val="0"/>
+              </a:spcBef>
+              <a:spcAft>
+                <a:spcPct val="0"/>
+              </a:spcAft>
+              <a:defRPr>
+                <a:solidFill>
+                  <a:schemeClr val="tx1"/>
+                </a:solidFill>
+                <a:latin typeface="Arial" panose="020B0604020202020204" pitchFamily="34" charset="0"/>
+              </a:defRPr>
+            </a:lvl4pPr>
+            <a:lvl5pPr eaLnBrk="0" fontAlgn="base" hangingPunct="0">
+              <a:spcBef>
+                <a:spcPct val="0"/>
+              </a:spcBef>
+              <a:spcAft>
+                <a:spcPct val="0"/>
+              </a:spcAft>
+              <a:defRPr>
+                <a:solidFill>
+                  <a:schemeClr val="tx1"/>
+                </a:solidFill>
+                <a:latin typeface="Arial" panose="020B0604020202020204" pitchFamily="34" charset="0"/>
+              </a:defRPr>
+            </a:lvl5pPr>
+            <a:lvl6pPr eaLnBrk="0" fontAlgn="base" hangingPunct="0">
+              <a:spcBef>
+                <a:spcPct val="0"/>
+              </a:spcBef>
+              <a:spcAft>
+                <a:spcPct val="0"/>
+              </a:spcAft>
+              <a:defRPr>
+                <a:solidFill>
+                  <a:schemeClr val="tx1"/>
+                </a:solidFill>
+                <a:latin typeface="Arial" panose="020B0604020202020204" pitchFamily="34" charset="0"/>
+              </a:defRPr>
+            </a:lvl6pPr>
+            <a:lvl7pPr eaLnBrk="0" fontAlgn="base" hangingPunct="0">
+              <a:spcBef>
+                <a:spcPct val="0"/>
+              </a:spcBef>
+              <a:spcAft>
+                <a:spcPct val="0"/>
+              </a:spcAft>
+              <a:defRPr>
+                <a:solidFill>
+                  <a:schemeClr val="tx1"/>
+                </a:solidFill>
+                <a:latin typeface="Arial" panose="020B0604020202020204" pitchFamily="34" charset="0"/>
+              </a:defRPr>
+            </a:lvl7pPr>
+            <a:lvl8pPr eaLnBrk="0" fontAlgn="base" hangingPunct="0">
+              <a:spcBef>
+                <a:spcPct val="0"/>
+              </a:spcBef>
+              <a:spcAft>
+                <a:spcPct val="0"/>
+              </a:spcAft>
+              <a:defRPr>
+                <a:solidFill>
+                  <a:schemeClr val="tx1"/>
+                </a:solidFill>
+                <a:latin typeface="Arial" panose="020B0604020202020204" pitchFamily="34" charset="0"/>
+              </a:defRPr>
+            </a:lvl8pPr>
+            <a:lvl9pPr eaLnBrk="0" fontAlgn="base" hangingPunct="0">
+              <a:spcBef>
+                <a:spcPct val="0"/>
+              </a:spcBef>
+              <a:spcAft>
+                <a:spcPct val="0"/>
+              </a:spcAft>
+              <a:defRPr>
+                <a:solidFill>
+                  <a:schemeClr val="tx1"/>
+                </a:solidFill>
+                <a:latin typeface="Arial" panose="020B0604020202020204" pitchFamily="34" charset="0"/>
+              </a:defRPr>
+            </a:lvl9pPr>
+          </a:lstStyle>
+          <a:p>
+            <a:pPr marR="0" lvl="0" algn="l" defTabSz="914400" rtl="0" eaLnBrk="0" fontAlgn="base" latinLnBrk="0" hangingPunct="0">
+              <a:lnSpc>
+                <a:spcPct val="100000"/>
+              </a:lnSpc>
+              <a:spcBef>
+                <a:spcPct val="0"/>
+              </a:spcBef>
+              <a:spcAft>
+                <a:spcPct val="0"/>
+              </a:spcAft>
+              <a:buClrTx/>
+              <a:buSzTx/>
+              <a:buFont typeface="Wingdings" panose="05000000000000000000" pitchFamily="2" charset="2"/>
+              <a:buChar char="q"/>
+              <a:tabLst/>
+            </a:pPr>
+            <a:r>
+              <a:rPr lang="en-US" altLang="en-US" sz="1800" dirty="0">
                 <a:latin typeface="+mn-lt"/>
               </a:rPr>
-              <a:t>nationality, between the ages of 15-30</a:t>
-            </a:r>
-            <a:r>
-              <a:rPr kumimoji="0" lang="en-US" altLang="en-US" sz="1200" b="0" i="0" u="none" strike="noStrike" cap="none" normalizeH="0" baseline="0" dirty="0">
+              <a:t>  </a:t>
+            </a:r>
+            <a:r>
+              <a:rPr lang="en-US" altLang="en-US" sz="1800" dirty="0">
+                <a:latin typeface="Georgia" panose="02040502050405020303" pitchFamily="18" charset="0"/>
+              </a:rPr>
+              <a:t>S</a:t>
+            </a:r>
+            <a:r>
+              <a:rPr kumimoji="0" lang="en-US" altLang="en-US" sz="1800" b="0" i="0" u="none" strike="noStrike" cap="none" normalizeH="0" baseline="0" dirty="0">
                 <a:ln>
                   <a:noFill/>
                 </a:ln>
@@ -4514,10 +6103,91 @@
                   <a:schemeClr val="tx1"/>
                 </a:solidFill>
                 <a:effectLst/>
-                <a:latin typeface="+mn-lt"/>
+                <a:latin typeface="Georgia" panose="02040502050405020303" pitchFamily="18" charset="0"/>
+              </a:rPr>
+              <a:t>tudents in</a:t>
+            </a:r>
+            <a:r>
+              <a:rPr lang="en-US" altLang="en-US" sz="1800" dirty="0">
+                <a:latin typeface="Georgia" panose="02040502050405020303" pitchFamily="18" charset="0"/>
+              </a:rPr>
+              <a:t> the Social Sciences department of a Slovakian university </a:t>
+            </a:r>
+            <a:r>
+              <a:rPr kumimoji="0" lang="en-US" altLang="en-US" sz="1800" b="0" i="0" u="none" strike="noStrike" cap="none" normalizeH="0" baseline="0" dirty="0">
+                <a:ln>
+                  <a:noFill/>
+                </a:ln>
+                <a:solidFill>
+                  <a:schemeClr val="tx1"/>
+                </a:solidFill>
+                <a:effectLst/>
+                <a:latin typeface="Georgia" panose="02040502050405020303" pitchFamily="18" charset="0"/>
+              </a:rPr>
+              <a:t>were asked to get their friends to participate in a survey in 2013.</a:t>
+            </a:r>
+          </a:p>
+          <a:p>
+            <a:pPr marR="0" lvl="0" algn="l" defTabSz="914400" rtl="0" eaLnBrk="0" fontAlgn="base" latinLnBrk="0" hangingPunct="0">
+              <a:lnSpc>
+                <a:spcPct val="100000"/>
+              </a:lnSpc>
+              <a:spcBef>
+                <a:spcPct val="0"/>
+              </a:spcBef>
+              <a:spcAft>
+                <a:spcPct val="0"/>
+              </a:spcAft>
+              <a:buClrTx/>
+              <a:buSzTx/>
+              <a:buFont typeface="Wingdings" panose="05000000000000000000" pitchFamily="2" charset="2"/>
+              <a:buChar char="q"/>
+              <a:tabLst/>
+            </a:pPr>
+            <a:endParaRPr kumimoji="0" lang="en-US" altLang="en-US" sz="1000" b="0" i="0" u="none" strike="noStrike" cap="none" normalizeH="0" baseline="0" dirty="0">
+              <a:ln>
+                <a:noFill/>
+              </a:ln>
+              <a:solidFill>
+                <a:schemeClr val="tx1"/>
+              </a:solidFill>
+              <a:effectLst/>
+              <a:latin typeface="Georgia" panose="02040502050405020303" pitchFamily="18" charset="0"/>
+            </a:endParaRPr>
+          </a:p>
+          <a:p>
+            <a:pPr lvl="1">
+              <a:buFont typeface="Wingdings" panose="05000000000000000000" pitchFamily="2" charset="2"/>
+              <a:buChar char="q"/>
+            </a:pPr>
+            <a:r>
+              <a:rPr lang="en-US" altLang="en-US" sz="1600" dirty="0">
+                <a:latin typeface="Georgia" panose="02040502050405020303" pitchFamily="18" charset="0"/>
+              </a:rPr>
+              <a:t>  All participants were between the </a:t>
+            </a:r>
+            <a:r>
+              <a:rPr lang="en-US" altLang="en-US" sz="1600" b="1" dirty="0">
+                <a:latin typeface="Georgia" panose="02040502050405020303" pitchFamily="18" charset="0"/>
+              </a:rPr>
+              <a:t>ages of 15-30</a:t>
+            </a:r>
+            <a:r>
+              <a:rPr lang="en-US" altLang="en-US" sz="1600" dirty="0">
+                <a:latin typeface="Georgia" panose="02040502050405020303" pitchFamily="18" charset="0"/>
               </a:rPr>
               <a:t>.</a:t>
             </a:r>
+            <a:endParaRPr kumimoji="0" lang="en-US" altLang="en-US" sz="1600" b="0" i="0" u="none" strike="noStrike" cap="none" normalizeH="0" baseline="0" dirty="0">
+              <a:ln>
+                <a:noFill/>
+              </a:ln>
+              <a:solidFill>
+                <a:schemeClr val="tx1"/>
+              </a:solidFill>
+              <a:effectLst/>
+              <a:latin typeface="Georgia" panose="02040502050405020303" pitchFamily="18" charset="0"/>
+            </a:endParaRPr>
           </a:p>
           <a:p>
             <a:pPr marL="0" marR="0" lvl="0" indent="0" algn="l" defTabSz="914400" rtl="0" eaLnBrk="0" fontAlgn="base" latinLnBrk="0" hangingPunct="0">
@@ -4536,7 +6206,7 @@
               <a:buNone/>
               <a:tabLst/>
             </a:pPr>
-            <a:endParaRPr kumimoji="0" lang="en-US" altLang="en-US" sz="1200" b="0" i="0" u="none" strike="noStrike" cap="none" normalizeH="0" baseline="0" dirty="0">
+            <a:endParaRPr kumimoji="0" lang="en-US" altLang="en-US" sz="1000" b="0" i="0" u="none" strike="noStrike" cap="none" normalizeH="0" baseline="0" dirty="0">
               <a:ln>
                 <a:noFill/>
               </a:ln>
@@ -4544,7 +6214,7 @@
                 <a:schemeClr val="tx1"/>
               </a:solidFill>
               <a:effectLst/>
-              <a:latin typeface="+mn-lt"/>
+              <a:latin typeface="Georgia" panose="02040502050405020303" pitchFamily="18" charset="0"/>
             </a:endParaRPr>
           </a:p>
           <a:p>
@@ -4565,7 +6235,13 @@
               <a:tabLst/>
             </a:pPr>
             <a:r>
-              <a:rPr kumimoji="0" lang="en-US" altLang="en-US" sz="1200" b="0" i="0" u="none" strike="noStrike" cap="none" normalizeH="0" baseline="0" dirty="0">
+              <a:rPr lang="en-US" altLang="en-US" sz="1800" dirty="0">
+                <a:latin typeface="Georgia" panose="02040502050405020303" pitchFamily="18" charset="0"/>
+              </a:rPr>
+              <a:t>  </a:t>
+            </a:r>
+            <a:r>
+              <a:rPr kumimoji="0" lang="en-US" altLang="en-US" sz="1800" b="0" i="0" u="none" strike="noStrike" cap="none" normalizeH="0" baseline="0" dirty="0">
                 <a:ln>
                   <a:noFill/>
                 </a:ln>
@@ -4573,9 +6249,74 @@
                   <a:schemeClr val="tx1"/>
                 </a:solidFill>
                 <a:effectLst/>
-                <a:latin typeface="+mn-lt"/>
+                <a:latin typeface="Georgia" panose="02040502050405020303" pitchFamily="18" charset="0"/>
               </a:rPr>
-              <a:t>  The variables can be split into the following groups:</a:t>
+              <a:t>The data file consists of 1,010 </a:t>
+            </a:r>
+            <a:r>
+              <a:rPr lang="en-US" altLang="en-US" sz="1800" dirty="0">
+                <a:latin typeface="Georgia" panose="02040502050405020303" pitchFamily="18" charset="0"/>
+              </a:rPr>
+              <a:t>responses.</a:t>
+            </a:r>
+          </a:p>
+          <a:p>
+            <a:pPr marR="0" lvl="0" algn="l" defTabSz="914400" rtl="0" eaLnBrk="0" fontAlgn="base" latinLnBrk="0" hangingPunct="0">
+              <a:lnSpc>
+                <a:spcPct val="100000"/>
+              </a:lnSpc>
+              <a:spcBef>
+                <a:spcPct val="0"/>
+              </a:spcBef>
+              <a:spcAft>
+                <a:spcPct val="0"/>
+              </a:spcAft>
+              <a:buClrTx/>
+              <a:buSzTx/>
+              <a:buFont typeface="Wingdings" panose="05000000000000000000" pitchFamily="2" charset="2"/>
+              <a:buChar char="q"/>
+              <a:tabLst/>
+            </a:pPr>
+            <a:endParaRPr kumimoji="0" lang="en-US" altLang="en-US" sz="1000" b="0" i="0" u="none" strike="noStrike" cap="none" normalizeH="0" baseline="0" dirty="0">
+              <a:ln>
+                <a:noFill/>
+              </a:ln>
+              <a:solidFill>
+                <a:schemeClr val="tx1"/>
+              </a:solidFill>
+              <a:effectLst/>
+              <a:latin typeface="Georgia" panose="02040502050405020303" pitchFamily="18" charset="0"/>
+            </a:endParaRPr>
+          </a:p>
+          <a:p>
+            <a:pPr marR="0" lvl="0" algn="l" defTabSz="914400" rtl="0" eaLnBrk="0" fontAlgn="base" latinLnBrk="0" hangingPunct="0">
+              <a:lnSpc>
+                <a:spcPct val="100000"/>
+              </a:lnSpc>
+              <a:spcBef>
+                <a:spcPct val="0"/>
+              </a:spcBef>
+              <a:spcAft>
+                <a:spcPct val="0"/>
+              </a:spcAft>
+              <a:buClrTx/>
+              <a:buSzTx/>
+              <a:buFont typeface="Wingdings" panose="05000000000000000000" pitchFamily="2" charset="2"/>
+              <a:buChar char="q"/>
+              <a:tabLst/>
+            </a:pPr>
+            <a:r>
+              <a:rPr kumimoji="0" lang="en-US" altLang="en-US" sz="1800" b="0" i="0" u="none" strike="noStrike" cap="none" normalizeH="0" baseline="0" dirty="0">
+                <a:ln>
+                  <a:noFill/>
+                </a:ln>
+                <a:solidFill>
+                  <a:schemeClr val="tx1"/>
+                </a:solidFill>
+                <a:effectLst/>
+                <a:latin typeface="Georgia" panose="02040502050405020303" pitchFamily="18" charset="0"/>
+              </a:rPr>
+              <a:t>  The original questionnaire was in Slovak language and was later translated into English.</a:t>
             </a:r>
           </a:p>
           <a:p>
@@ -4591,8 +6332,7 @@
               </a:spcAft>
               <a:buClrTx/>
               <a:buSzTx/>
-              <a:buFontTx/>
-              <a:buChar char="•"/>
+              <a:buNone/>
               <a:tabLst/>
             </a:pPr>
             <a:endParaRPr kumimoji="0" lang="en-US" altLang="en-US" sz="1000" b="0" i="0" u="none" strike="noStrike" cap="none" normalizeH="0" baseline="0" dirty="0">
@@ -4603,16 +6343,28 @@
                 <a:schemeClr val="tx1"/>
               </a:solidFill>
               <a:effectLst/>
-              <a:latin typeface="+mn-lt"/>
+              <a:latin typeface="Georgia" panose="02040502050405020303" pitchFamily="18" charset="0"/>
             </a:endParaRPr>
           </a:p>
           <a:p>
-            <a:pPr marL="292608" lvl="1" indent="0">
-              <a:buFontTx/>
-              <a:buChar char="•"/>
+            <a:pPr marR="0" lvl="0" algn="l" defTabSz="914400" rtl="0" eaLnBrk="0" fontAlgn="base" latinLnBrk="0" hangingPunct="0">
+              <a:lnSpc>
+                <a:spcPct val="100000"/>
+              </a:lnSpc>
+              <a:spcBef>
+                <a:spcPct val="0"/>
+              </a:spcBef>
+              <a:spcAft>
+                <a:spcPct val="0"/>
+              </a:spcAft>
+              <a:buClrTx/>
+              <a:buSzTx/>
+              <a:buFont typeface="Wingdings" panose="05000000000000000000" pitchFamily="2" charset="2"/>
+              <a:buChar char="q"/>
+              <a:tabLst/>
             </a:pPr>
             <a:r>
-              <a:rPr kumimoji="0" lang="en-US" altLang="en-US" sz="1000" b="0" i="0" u="none" strike="noStrike" cap="none" normalizeH="0" baseline="0" dirty="0">
+              <a:rPr kumimoji="0" lang="en-US" altLang="en-US" sz="1800" b="0" i="0" u="none" strike="noStrike" cap="none" normalizeH="0" baseline="0" dirty="0">
                 <a:ln>
                   <a:noFill/>
                 </a:ln>
@@ -4620,303 +6372,374 @@
                   <a:schemeClr val="tx1"/>
                 </a:solidFill>
                 <a:effectLst/>
-                <a:latin typeface="+mn-lt"/>
+                <a:latin typeface="Georgia" panose="02040502050405020303" pitchFamily="18" charset="0"/>
               </a:rPr>
-              <a:t>Music preferences (19 </a:t>
-            </a:r>
-            <a:r>
-              <a:rPr lang="en-US" altLang="en-US" sz="1000" dirty="0">
-                <a:latin typeface="+mn-lt"/>
-              </a:rPr>
-              <a:t>questions</a:t>
-            </a:r>
-            <a:r>
-              <a:rPr kumimoji="0" lang="en-US" altLang="en-US" sz="1000" b="0" i="0" u="none" strike="noStrike" cap="none" normalizeH="0" baseline="0" dirty="0">
-                <a:ln>
-                  <a:noFill/>
-                </a:ln>
-                <a:solidFill>
-                  <a:schemeClr val="tx1"/>
-                </a:solidFill>
-                <a:effectLst/>
-                <a:latin typeface="+mn-lt"/>
-              </a:rPr>
-              <a:t>)</a:t>
-            </a:r>
-          </a:p>
-          <a:p>
-            <a:pPr marL="292608" lvl="1" indent="0">
-              <a:buFontTx/>
-              <a:buChar char="•"/>
-            </a:pPr>
-            <a:r>
-              <a:rPr kumimoji="0" lang="en-US" altLang="en-US" sz="1000" b="0" i="0" u="none" strike="noStrike" cap="none" normalizeH="0" baseline="0" dirty="0">
-                <a:ln>
-                  <a:noFill/>
-                </a:ln>
-                <a:solidFill>
-                  <a:schemeClr val="tx1"/>
-                </a:solidFill>
-                <a:effectLst/>
-                <a:latin typeface="+mn-lt"/>
-              </a:rPr>
-              <a:t>Movie preferences (12 </a:t>
-            </a:r>
-            <a:r>
-              <a:rPr lang="en-US" altLang="en-US" sz="1000" dirty="0">
-                <a:latin typeface="+mn-lt"/>
-              </a:rPr>
-              <a:t>questions</a:t>
-            </a:r>
-            <a:r>
-              <a:rPr kumimoji="0" lang="en-US" altLang="en-US" sz="1000" b="0" i="0" u="none" strike="noStrike" cap="none" normalizeH="0" baseline="0" dirty="0">
-                <a:ln>
-                  <a:noFill/>
-                </a:ln>
-                <a:solidFill>
-                  <a:schemeClr val="tx1"/>
-                </a:solidFill>
-                <a:effectLst/>
-                <a:latin typeface="+mn-lt"/>
-              </a:rPr>
-              <a:t>)</a:t>
-            </a:r>
-          </a:p>
-          <a:p>
-            <a:pPr marL="292608" lvl="1" indent="0">
-              <a:buFontTx/>
-              <a:buChar char="•"/>
-            </a:pPr>
-            <a:r>
-              <a:rPr kumimoji="0" lang="en-US" altLang="en-US" sz="1000" b="0" i="0" u="none" strike="noStrike" cap="none" normalizeH="0" baseline="0" dirty="0">
-                <a:ln>
-                  <a:noFill/>
-                </a:ln>
-                <a:solidFill>
-                  <a:schemeClr val="tx1"/>
-                </a:solidFill>
-                <a:effectLst/>
-                <a:latin typeface="+mn-lt"/>
-              </a:rPr>
-              <a:t>Hobbies &amp; interests (32 </a:t>
-            </a:r>
-            <a:r>
-              <a:rPr lang="en-US" altLang="en-US" sz="1000" dirty="0">
-                <a:latin typeface="+mn-lt"/>
-              </a:rPr>
-              <a:t>questions</a:t>
-            </a:r>
-            <a:r>
-              <a:rPr kumimoji="0" lang="en-US" altLang="en-US" sz="1000" b="0" i="0" u="none" strike="noStrike" cap="none" normalizeH="0" baseline="0" dirty="0">
-                <a:ln>
-                  <a:noFill/>
-                </a:ln>
-                <a:solidFill>
-                  <a:schemeClr val="tx1"/>
-                </a:solidFill>
-                <a:effectLst/>
-                <a:latin typeface="+mn-lt"/>
-              </a:rPr>
-              <a:t>)</a:t>
-            </a:r>
-          </a:p>
-          <a:p>
-            <a:pPr marL="292608" lvl="1" indent="0">
-              <a:buFontTx/>
-              <a:buChar char="•"/>
-            </a:pPr>
-            <a:r>
-              <a:rPr kumimoji="0" lang="en-US" altLang="en-US" sz="1000" b="0" i="0" u="none" strike="noStrike" cap="none" normalizeH="0" baseline="0" dirty="0">
-                <a:ln>
-                  <a:noFill/>
-                </a:ln>
-                <a:solidFill>
-                  <a:schemeClr val="tx1"/>
-                </a:solidFill>
-                <a:effectLst/>
-                <a:latin typeface="+mn-lt"/>
-              </a:rPr>
-              <a:t>Phobias (10 </a:t>
-            </a:r>
-            <a:r>
-              <a:rPr lang="en-US" altLang="en-US" sz="1000" dirty="0">
-                <a:latin typeface="+mn-lt"/>
-              </a:rPr>
-              <a:t>questions</a:t>
-            </a:r>
-            <a:r>
-              <a:rPr kumimoji="0" lang="en-US" altLang="en-US" sz="1000" b="0" i="0" u="none" strike="noStrike" cap="none" normalizeH="0" baseline="0" dirty="0">
-                <a:ln>
-                  <a:noFill/>
-                </a:ln>
-                <a:solidFill>
-                  <a:schemeClr val="tx1"/>
-                </a:solidFill>
-                <a:effectLst/>
-                <a:latin typeface="+mn-lt"/>
-              </a:rPr>
-              <a:t>)</a:t>
-            </a:r>
-          </a:p>
-          <a:p>
-            <a:pPr marL="292608" lvl="1" indent="0">
-              <a:buFontTx/>
-              <a:buChar char="•"/>
-            </a:pPr>
-            <a:r>
-              <a:rPr kumimoji="0" lang="en-US" altLang="en-US" sz="1000" b="0" i="0" u="none" strike="noStrike" cap="none" normalizeH="0" baseline="0" dirty="0">
-                <a:ln>
-                  <a:noFill/>
-                </a:ln>
-                <a:solidFill>
-                  <a:schemeClr val="tx1"/>
-                </a:solidFill>
-                <a:effectLst/>
-                <a:latin typeface="+mn-lt"/>
-              </a:rPr>
-              <a:t>Health habits (3 </a:t>
-            </a:r>
-            <a:r>
-              <a:rPr lang="en-US" altLang="en-US" sz="1000" dirty="0">
-                <a:latin typeface="+mn-lt"/>
-              </a:rPr>
-              <a:t>questions</a:t>
-            </a:r>
-            <a:r>
-              <a:rPr kumimoji="0" lang="en-US" altLang="en-US" sz="1000" b="0" i="0" u="none" strike="noStrike" cap="none" normalizeH="0" baseline="0" dirty="0">
-                <a:ln>
-                  <a:noFill/>
-                </a:ln>
-                <a:solidFill>
-                  <a:schemeClr val="tx1"/>
-                </a:solidFill>
-                <a:effectLst/>
-                <a:latin typeface="+mn-lt"/>
-              </a:rPr>
-              <a:t>)</a:t>
-            </a:r>
-          </a:p>
-          <a:p>
-            <a:pPr marL="292608" lvl="1" indent="0">
-              <a:buFontTx/>
-              <a:buChar char="•"/>
-            </a:pPr>
-            <a:r>
-              <a:rPr kumimoji="0" lang="en-US" altLang="en-US" sz="1000" b="0" i="0" u="none" strike="noStrike" cap="none" normalizeH="0" baseline="0" dirty="0">
-                <a:ln>
-                  <a:noFill/>
-                </a:ln>
-                <a:solidFill>
-                  <a:schemeClr val="tx1"/>
-                </a:solidFill>
-                <a:effectLst/>
-                <a:latin typeface="+mn-lt"/>
-              </a:rPr>
-              <a:t>Personality traits, views on life, &amp; opinions (57 </a:t>
-            </a:r>
-            <a:r>
-              <a:rPr lang="en-US" altLang="en-US" sz="1000" dirty="0">
-                <a:latin typeface="+mn-lt"/>
-              </a:rPr>
-              <a:t>questions</a:t>
-            </a:r>
-            <a:r>
-              <a:rPr kumimoji="0" lang="en-US" altLang="en-US" sz="1000" b="0" i="0" u="none" strike="noStrike" cap="none" normalizeH="0" baseline="0" dirty="0">
-                <a:ln>
-                  <a:noFill/>
-                </a:ln>
-                <a:solidFill>
-                  <a:schemeClr val="tx1"/>
-                </a:solidFill>
-                <a:effectLst/>
-                <a:latin typeface="+mn-lt"/>
-              </a:rPr>
-              <a:t>)</a:t>
-            </a:r>
-          </a:p>
-          <a:p>
-            <a:pPr marL="292608" lvl="1" indent="0">
-              <a:buFontTx/>
-              <a:buChar char="•"/>
-            </a:pPr>
-            <a:r>
-              <a:rPr kumimoji="0" lang="en-US" altLang="en-US" sz="1000" b="0" i="0" u="none" strike="noStrike" cap="none" normalizeH="0" baseline="0" dirty="0">
-                <a:ln>
-                  <a:noFill/>
-                </a:ln>
-                <a:solidFill>
-                  <a:schemeClr val="tx1"/>
-                </a:solidFill>
-                <a:effectLst/>
-                <a:latin typeface="+mn-lt"/>
-              </a:rPr>
-              <a:t>Spending habits (7 </a:t>
-            </a:r>
-            <a:r>
-              <a:rPr lang="en-US" altLang="en-US" sz="1000" dirty="0">
-                <a:latin typeface="+mn-lt"/>
-              </a:rPr>
-              <a:t>questions</a:t>
-            </a:r>
-            <a:r>
-              <a:rPr kumimoji="0" lang="en-US" altLang="en-US" sz="1000" b="0" i="0" u="none" strike="noStrike" cap="none" normalizeH="0" baseline="0" dirty="0">
-                <a:ln>
-                  <a:noFill/>
-                </a:ln>
-                <a:solidFill>
-                  <a:schemeClr val="tx1"/>
-                </a:solidFill>
-                <a:effectLst/>
-                <a:latin typeface="+mn-lt"/>
-              </a:rPr>
-              <a:t>)</a:t>
-            </a:r>
-          </a:p>
-          <a:p>
-            <a:pPr marL="292608" lvl="1" indent="0">
-              <a:buFontTx/>
-              <a:buChar char="•"/>
-            </a:pPr>
-            <a:r>
-              <a:rPr kumimoji="0" lang="en-US" altLang="en-US" sz="1000" b="0" i="0" u="none" strike="noStrike" cap="none" normalizeH="0" baseline="0" dirty="0">
-                <a:ln>
-                  <a:noFill/>
-                </a:ln>
-                <a:solidFill>
-                  <a:schemeClr val="tx1"/>
-                </a:solidFill>
-                <a:effectLst/>
-                <a:latin typeface="+mn-lt"/>
-              </a:rPr>
-              <a:t>Demographics (10 items)</a:t>
-            </a:r>
-          </a:p>
-        </p:txBody>
-      </p:sp>
+              <a:t>  Questions were based on 8 groups:</a:t>
+            </a:r>
+          </a:p>
+        </p:txBody>
+      </p:sp>
+      <p:grpSp>
+        <p:nvGrpSpPr>
+          <p:cNvPr id="7" name="Group 6">
+            <a:extLst>
+              <a:ext uri="{FF2B5EF4-FFF2-40B4-BE49-F238E27FC236}">
+                <a16:creationId xmlns:a16="http://schemas.microsoft.com/office/drawing/2014/main" id="{E59FC5F1-EFEF-9544-8975-85DD36A87E2E}"/>
+              </a:ext>
+            </a:extLst>
+          </p:cNvPr>
+          <p:cNvGrpSpPr/>
+          <p:nvPr/>
+        </p:nvGrpSpPr>
+        <p:grpSpPr>
+          <a:xfrm>
+            <a:off x="1484875" y="4412609"/>
+            <a:ext cx="10430899" cy="1461939"/>
+            <a:chOff x="1473300" y="4500995"/>
+            <a:chExt cx="10430899" cy="1461939"/>
+          </a:xfrm>
+        </p:grpSpPr>
+        <p:sp>
+          <p:nvSpPr>
+            <p:cNvPr id="5" name="TextBox 4">
+              <a:extLst>
+                <a:ext uri="{FF2B5EF4-FFF2-40B4-BE49-F238E27FC236}">
+                  <a16:creationId xmlns:a16="http://schemas.microsoft.com/office/drawing/2014/main" id="{60B60084-FD6D-1444-9A99-9AB1ABC4C945}"/>
+                </a:ext>
+              </a:extLst>
+            </p:cNvPr>
+            <p:cNvSpPr txBox="1"/>
+            <p:nvPr/>
+          </p:nvSpPr>
+          <p:spPr>
+            <a:xfrm>
+              <a:off x="1473300" y="4500995"/>
+              <a:ext cx="3411216" cy="1415772"/>
+            </a:xfrm>
+            <a:prstGeom prst="rect">
+              <a:avLst/>
+            </a:prstGeom>
+            <a:noFill/>
+          </p:spPr>
+          <p:txBody>
+            <a:bodyPr wrap="square" rtlCol="0">
+              <a:spAutoFit/>
+            </a:bodyPr>
+            <a:lstStyle/>
+            <a:p>
+              <a:pPr marL="578358" lvl="1" indent="-285750">
+                <a:buFont typeface="Arial" panose="020B0604020202020204" pitchFamily="34" charset="0"/>
+                <a:buChar char="•"/>
+              </a:pPr>
+              <a:r>
+                <a:rPr lang="en-US" altLang="en-US" sz="1700" dirty="0">
+                  <a:latin typeface="Georgia" panose="02040502050405020303" pitchFamily="18" charset="0"/>
+                </a:rPr>
+                <a:t>Music preferences (19)</a:t>
+              </a:r>
+            </a:p>
+            <a:p>
+              <a:pPr marL="578358" lvl="1" indent="-285750">
+                <a:buFont typeface="Arial" panose="020B0604020202020204" pitchFamily="34" charset="0"/>
+                <a:buChar char="•"/>
+              </a:pPr>
+              <a:endParaRPr lang="en-US" altLang="en-US" sz="500" dirty="0">
+                <a:latin typeface="Georgia" panose="02040502050405020303" pitchFamily="18" charset="0"/>
+              </a:endParaRPr>
+            </a:p>
+            <a:p>
+              <a:pPr marL="578358" lvl="1" indent="-285750">
+                <a:buFont typeface="Arial" panose="020B0604020202020204" pitchFamily="34" charset="0"/>
+                <a:buChar char="•"/>
+              </a:pPr>
+              <a:r>
+                <a:rPr lang="en-US" altLang="en-US" sz="1700" dirty="0">
+                  <a:latin typeface="Georgia" panose="02040502050405020303" pitchFamily="18" charset="0"/>
+                </a:rPr>
+                <a:t>Movie preferences (12)</a:t>
+              </a:r>
+            </a:p>
+            <a:p>
+              <a:pPr marL="578358" lvl="1" indent="-285750">
+                <a:buFont typeface="Arial" panose="020B0604020202020204" pitchFamily="34" charset="0"/>
+                <a:buChar char="•"/>
+              </a:pPr>
+              <a:endParaRPr lang="en-US" altLang="en-US" sz="500" dirty="0">
+                <a:latin typeface="Georgia" panose="02040502050405020303" pitchFamily="18" charset="0"/>
+              </a:endParaRPr>
+            </a:p>
+            <a:p>
+              <a:pPr marL="578358" lvl="1" indent="-285750">
+                <a:buFont typeface="Arial" panose="020B0604020202020204" pitchFamily="34" charset="0"/>
+                <a:buChar char="•"/>
+              </a:pPr>
+              <a:r>
+                <a:rPr lang="en-US" altLang="en-US" sz="1700" dirty="0">
+                  <a:latin typeface="Georgia" panose="02040502050405020303" pitchFamily="18" charset="0"/>
+                </a:rPr>
+                <a:t>Hobbies &amp; interests (32)</a:t>
+              </a:r>
+            </a:p>
+            <a:p>
+              <a:pPr marL="578358" lvl="1" indent="-285750">
+                <a:buFont typeface="Arial" panose="020B0604020202020204" pitchFamily="34" charset="0"/>
+                <a:buChar char="•"/>
+              </a:pPr>
+              <a:endParaRPr lang="en-US" altLang="en-US" sz="500" dirty="0">
+                <a:latin typeface="Georgia" panose="02040502050405020303" pitchFamily="18" charset="0"/>
+              </a:endParaRPr>
+            </a:p>
+            <a:p>
+              <a:pPr marL="578358" lvl="1" indent="-285750">
+                <a:buFont typeface="Arial" panose="020B0604020202020204" pitchFamily="34" charset="0"/>
+                <a:buChar char="•"/>
+              </a:pPr>
+              <a:r>
+                <a:rPr lang="en-US" altLang="en-US" sz="2000" b="1" dirty="0">
+                  <a:latin typeface="Georgia" panose="02040502050405020303" pitchFamily="18" charset="0"/>
+                </a:rPr>
+                <a:t>Phobias (10)</a:t>
+              </a:r>
+            </a:p>
+          </p:txBody>
+        </p:sp>
+        <p:sp>
+          <p:nvSpPr>
+            <p:cNvPr id="6" name="TextBox 5">
+              <a:extLst>
+                <a:ext uri="{FF2B5EF4-FFF2-40B4-BE49-F238E27FC236}">
+                  <a16:creationId xmlns:a16="http://schemas.microsoft.com/office/drawing/2014/main" id="{E39405B9-F38B-3D49-9FEC-AF1FC765D271}"/>
+                </a:ext>
+              </a:extLst>
+            </p:cNvPr>
+            <p:cNvSpPr txBox="1"/>
+            <p:nvPr/>
+          </p:nvSpPr>
+          <p:spPr>
+            <a:xfrm>
+              <a:off x="4907660" y="4500995"/>
+              <a:ext cx="6996539" cy="1461939"/>
+            </a:xfrm>
+            <a:prstGeom prst="rect">
+              <a:avLst/>
+            </a:prstGeom>
+            <a:noFill/>
+          </p:spPr>
+          <p:txBody>
+            <a:bodyPr wrap="square" rtlCol="0">
+              <a:spAutoFit/>
+            </a:bodyPr>
+            <a:lstStyle/>
+            <a:p>
+              <a:pPr marL="578358" lvl="1" indent="-285750">
+                <a:buFont typeface="Arial" panose="020B0604020202020204" pitchFamily="34" charset="0"/>
+                <a:buChar char="•"/>
+              </a:pPr>
+              <a:r>
+                <a:rPr lang="en-US" altLang="en-US" sz="1700" dirty="0">
+                  <a:latin typeface="Georgia" panose="02040502050405020303" pitchFamily="18" charset="0"/>
+                </a:rPr>
+                <a:t>Health habits (3)</a:t>
+              </a:r>
+            </a:p>
+            <a:p>
+              <a:pPr marL="578358" lvl="1" indent="-285750">
+                <a:buFont typeface="Arial" panose="020B0604020202020204" pitchFamily="34" charset="0"/>
+                <a:buChar char="•"/>
+              </a:pPr>
+              <a:endParaRPr lang="en-US" altLang="en-US" sz="500" dirty="0">
+                <a:latin typeface="Georgia" panose="02040502050405020303" pitchFamily="18" charset="0"/>
+              </a:endParaRPr>
+            </a:p>
+            <a:p>
+              <a:pPr marL="578358" lvl="1" indent="-285750">
+                <a:buFont typeface="Arial" panose="020B0604020202020204" pitchFamily="34" charset="0"/>
+                <a:buChar char="•"/>
+              </a:pPr>
+              <a:r>
+                <a:rPr lang="en-US" altLang="en-US" sz="2000" b="1" dirty="0">
+                  <a:latin typeface="Georgia" panose="02040502050405020303" pitchFamily="18" charset="0"/>
+                </a:rPr>
+                <a:t>Personality traits, views on life, &amp; opinions (57)</a:t>
+              </a:r>
+            </a:p>
+            <a:p>
+              <a:pPr marL="578358" lvl="1" indent="-285750">
+                <a:buFont typeface="Arial" panose="020B0604020202020204" pitchFamily="34" charset="0"/>
+                <a:buChar char="•"/>
+              </a:pPr>
+              <a:endParaRPr lang="en-US" altLang="en-US" sz="500" dirty="0">
+                <a:latin typeface="Georgia" panose="02040502050405020303" pitchFamily="18" charset="0"/>
+              </a:endParaRPr>
+            </a:p>
+            <a:p>
+              <a:pPr marL="578358" lvl="1" indent="-285750">
+                <a:buFont typeface="Arial" panose="020B0604020202020204" pitchFamily="34" charset="0"/>
+                <a:buChar char="•"/>
+              </a:pPr>
+              <a:r>
+                <a:rPr lang="en-US" altLang="en-US" sz="1700" dirty="0">
+                  <a:latin typeface="Georgia" panose="02040502050405020303" pitchFamily="18" charset="0"/>
+                </a:rPr>
+                <a:t>Spending habits (7)</a:t>
+              </a:r>
+            </a:p>
+            <a:p>
+              <a:pPr marL="578358" lvl="1" indent="-285750">
+                <a:buFont typeface="Arial" panose="020B0604020202020204" pitchFamily="34" charset="0"/>
+                <a:buChar char="•"/>
+              </a:pPr>
+              <a:endParaRPr lang="en-US" altLang="en-US" sz="500" dirty="0">
+                <a:latin typeface="Georgia" panose="02040502050405020303" pitchFamily="18" charset="0"/>
+              </a:endParaRPr>
+            </a:p>
+            <a:p>
+              <a:pPr marL="578358" lvl="1" indent="-285750">
+                <a:buFont typeface="Arial" panose="020B0604020202020204" pitchFamily="34" charset="0"/>
+                <a:buChar char="•"/>
+              </a:pPr>
+              <a:r>
+                <a:rPr lang="en-US" altLang="en-US" sz="2000" b="1" dirty="0">
+                  <a:latin typeface="Georgia" panose="02040502050405020303" pitchFamily="18" charset="0"/>
+                </a:rPr>
+                <a:t>Demographics (10)</a:t>
+              </a:r>
+            </a:p>
+          </p:txBody>
+        </p:sp>
+      </p:grpSp>
+      <p:cxnSp>
+        <p:nvCxnSpPr>
+          <p:cNvPr id="8" name="Straight Connector 7">
+            <a:extLst>
+              <a:ext uri="{FF2B5EF4-FFF2-40B4-BE49-F238E27FC236}">
+                <a16:creationId xmlns:a16="http://schemas.microsoft.com/office/drawing/2014/main" id="{5154EBED-D187-2F49-A303-74B3B4B94D41}"/>
+              </a:ext>
+            </a:extLst>
+          </p:cNvPr>
+          <p:cNvCxnSpPr/>
+          <p:nvPr/>
+        </p:nvCxnSpPr>
+        <p:spPr>
+          <a:xfrm>
+            <a:off x="11280289" y="5157788"/>
+            <a:ext cx="449748" cy="0"/>
+          </a:xfrm>
+          <a:prstGeom prst="line">
+            <a:avLst/>
+          </a:prstGeom>
+          <a:ln w="50800">
+            <a:solidFill>
+              <a:srgbClr val="FF0000"/>
+            </a:solidFill>
+          </a:ln>
+        </p:spPr>
+        <p:style>
+          <a:lnRef idx="2">
+            <a:schemeClr val="accent3"/>
+          </a:lnRef>
+          <a:fillRef idx="0">
+            <a:schemeClr val="accent3"/>
+          </a:fillRef>
+          <a:effectRef idx="1">
+            <a:schemeClr val="accent3"/>
+          </a:effectRef>
+          <a:fontRef idx="minor">
+            <a:schemeClr val="tx1"/>
+          </a:fontRef>
+        </p:style>
+      </p:cxnSp>
     </p:spTree>
     <p:extLst>
       <p:ext uri="{BB962C8B-B14F-4D97-AF65-F5344CB8AC3E}">
-        <p14:creationId xmlns:p14="http://schemas.microsoft.com/office/powerpoint/2010/main" val="653688861"/>
+        <p14:creationId xmlns:p14="http://schemas.microsoft.com/office/powerpoint/2010/main" val="1384458993"/>
       </p:ext>
     </p:extLst>
   </p:cSld>
   <p:clrMapOvr>
     <a:masterClrMapping/>
   </p:clrMapOvr>
+  <p:timing>
+    <p:tnLst>
+      <p:par>
+        <p:cTn id="1" dur="indefinite" restart="never" nodeType="tmRoot">
+          <p:childTnLst>
+            <p:seq concurrent="1" nextAc="seek">
+              <p:cTn id="2" dur="indefinite" nodeType="mainSeq">
+                <p:childTnLst>
+                  <p:par>
+                    <p:cTn id="3" fill="hold">
+                      <p:stCondLst>
+                        <p:cond delay="indefinite"/>
+                      </p:stCondLst>
+                      <p:childTnLst>
+                        <p:par>
+                          <p:cTn id="4" fill="hold">
+                            <p:stCondLst>
+                              <p:cond delay="0"/>
+                            </p:stCondLst>
+                            <p:childTnLst>
+                              <p:par>
+                                <p:cTn id="5" presetID="1" presetClass="entr" presetSubtype="0" fill="hold" nodeType="clickEffect">
+                                  <p:stCondLst>
+                                    <p:cond delay="0"/>
+                                  </p:stCondLst>
+                                  <p:childTnLst>
+                                    <p:set>
+                                      <p:cBhvr>
+                                        <p:cTn id="6" dur="1" fill="hold">
+                                          <p:stCondLst>
+                                            <p:cond delay="0"/>
+                                          </p:stCondLst>
+                                        </p:cTn>
+                                        <p:tgtEl>
+                                          <p:spTgt spid="8"/>
+                                        </p:tgtEl>
+                                        <p:attrNameLst>
+                                          <p:attrName>style.visibility</p:attrName>
+                                        </p:attrNameLst>
+                                      </p:cBhvr>
+                                      <p:to>
+                                        <p:strVal val="visible"/>
+                                      </p:to>
+                                    </p:set>
+                                  </p:childTnLst>
+                                </p:cTn>
+                              </p:par>
+                            </p:childTnLst>
+                          </p:cTn>
+                        </p:par>
+                      </p:childTnLst>
+                    </p:cTn>
+                  </p:par>
+                </p:childTnLst>
+              </p:cTn>
+              <p:prevCondLst>
+                <p:cond evt="onPrev" delay="0">
+                  <p:tgtEl>
+                    <p:sldTgt/>
+                  </p:tgtEl>
+                </p:cond>
+              </p:prevCondLst>
+              <p:nextCondLst>
+                <p:cond evt="onNext" delay="0">
+                  <p:tgtEl>
+                    <p:sldTgt/>
+                  </p:tgtEl>
+                </p:cond>
+              </p:nextCondLst>
+            </p:seq>
+          </p:childTnLst>
+        </p:cTn>
+      </p:par>
+    </p:tnLst>
+  </p:timing>
 </p:sld>
 </file>
 
-<file path=ppt/slides/slide3.xml><?xml version="1.0" encoding="utf-8"?>
+<file path=ppt/slides/slide5.xml><?xml version="1.0" encoding="utf-8"?>
 <p:sld xmlns:a="http://schemas.openxmlformats.org/drawingml/2006/main" xmlns:r="http://schemas.openxmlformats.org/officeDocument/2006/relationships" xmlns:p="http://schemas.openxmlformats.org/presentationml/2006/main">
   <p:cSld>
-    <p:bg>
-      <p:bgPr>
-        <a:solidFill>
-          <a:schemeClr val="bg1"/>
-        </a:solidFill>
-        <a:effectLst/>
-      </p:bgPr>
-    </p:bg>
     <p:spTree>
       <p:nvGrpSpPr>
         <p:cNvPr id="1" name=""/>
@@ -4933,41 +6756,599 @@
       </p:grpSpPr>
       <p:sp>
         <p:nvSpPr>
-          <p:cNvPr id="47" name="Rectangle 46">
+          <p:cNvPr id="4" name="Title 3">
             <a:extLst>
               <a:ext uri="{FF2B5EF4-FFF2-40B4-BE49-F238E27FC236}">
-                <a16:creationId xmlns:a16="http://schemas.microsoft.com/office/drawing/2014/main" id="{FBDCECDC-EEE3-4128-AA5E-82A8C08796E8}"/>
-              </a:ext>
-              <a:ext uri="{C183D7F6-B498-43B3-948B-1728B52AA6E4}">
-                <adec:decorative xmlns:adec="http://schemas.microsoft.com/office/drawing/2017/decorative" val="1"/>
+                <a16:creationId xmlns:a16="http://schemas.microsoft.com/office/drawing/2014/main" id="{2007FD3E-F1FC-714F-AFB0-F4CDCA4F7779}"/>
               </a:ext>
             </a:extLst>
           </p:cNvPr>
           <p:cNvSpPr>
-            <a:spLocks noGrp="1" noRot="1" noChangeAspect="1" noMove="1" noResize="1" noEditPoints="1" noAdjustHandles="1" noChangeArrowheads="1" noChangeShapeType="1" noTextEdit="1"/>
+            <a:spLocks noGrp="1"/>
           </p:cNvSpPr>
           <p:nvPr>
-            <p:extLst>
-              <p:ext uri="{386F3935-93C4-4BCD-93E2-E3B085C9AB24}">
-                <p16:designElem xmlns:p16="http://schemas.microsoft.com/office/powerpoint/2015/main" val="1"/>
-              </p:ext>
-            </p:extLst>
+            <p:ph type="title"/>
           </p:nvPr>
         </p:nvSpPr>
         <p:spPr>
           <a:xfrm>
-            <a:off x="1507" y="0"/>
-            <a:ext cx="12192000" cy="6858000"/>
+            <a:off x="672041" y="243458"/>
+            <a:ext cx="3517567" cy="2093975"/>
+          </a:xfrm>
+        </p:spPr>
+        <p:txBody>
+          <a:bodyPr>
+            <a:normAutofit/>
+          </a:bodyPr>
+          <a:lstStyle/>
+          <a:p>
+            <a:r>
+              <a:rPr lang="en-US" sz="5400" dirty="0">
+                <a:latin typeface="Georgia" panose="02040502050405020303" pitchFamily="18" charset="0"/>
+              </a:rPr>
+              <a:t>Settled on 5 targets</a:t>
+            </a:r>
+          </a:p>
+        </p:txBody>
+      </p:sp>
+      <p:sp>
+        <p:nvSpPr>
+          <p:cNvPr id="7" name="TextBox 6">
+            <a:extLst>
+              <a:ext uri="{FF2B5EF4-FFF2-40B4-BE49-F238E27FC236}">
+                <a16:creationId xmlns:a16="http://schemas.microsoft.com/office/drawing/2014/main" id="{95918AF5-E2DF-B649-9C78-AABBDDFC564C}"/>
+              </a:ext>
+            </a:extLst>
+          </p:cNvPr>
+          <p:cNvSpPr txBox="1"/>
+          <p:nvPr/>
+        </p:nvSpPr>
+        <p:spPr>
+          <a:xfrm>
+            <a:off x="5652100" y="751344"/>
+            <a:ext cx="4700587" cy="5355312"/>
+          </a:xfrm>
+          <a:prstGeom prst="rect">
+            <a:avLst/>
+          </a:prstGeom>
+          <a:noFill/>
+        </p:spPr>
+        <p:txBody>
+          <a:bodyPr wrap="square" rtlCol="0">
+            <a:spAutoFit/>
+          </a:bodyPr>
+          <a:lstStyle/>
+          <a:p>
+            <a:pPr marL="571500" indent="-571500">
+              <a:buFont typeface="Wingdings" pitchFamily="2" charset="2"/>
+              <a:buChar char="q"/>
+            </a:pPr>
+            <a:r>
+              <a:rPr lang="en-US" sz="3600" dirty="0">
+                <a:latin typeface="Georgia" panose="02040502050405020303" pitchFamily="18" charset="0"/>
+              </a:rPr>
+              <a:t> Gender</a:t>
+            </a:r>
+          </a:p>
+          <a:p>
+            <a:pPr marL="571500" indent="-571500">
+              <a:buFont typeface="Wingdings" pitchFamily="2" charset="2"/>
+              <a:buChar char="q"/>
+            </a:pPr>
+            <a:endParaRPr lang="en-US" sz="3600" dirty="0">
+              <a:latin typeface="Georgia" panose="02040502050405020303" pitchFamily="18" charset="0"/>
+            </a:endParaRPr>
+          </a:p>
+          <a:p>
+            <a:pPr marL="571500" indent="-571500">
+              <a:buFont typeface="Wingdings" pitchFamily="2" charset="2"/>
+              <a:buChar char="q"/>
+            </a:pPr>
+            <a:r>
+              <a:rPr lang="en-US" sz="3600" dirty="0">
+                <a:latin typeface="Georgia" panose="02040502050405020303" pitchFamily="18" charset="0"/>
+              </a:rPr>
+              <a:t> Education Level</a:t>
+            </a:r>
+          </a:p>
+          <a:p>
+            <a:pPr marL="571500" indent="-571500">
+              <a:buFont typeface="Wingdings" pitchFamily="2" charset="2"/>
+              <a:buChar char="q"/>
+            </a:pPr>
+            <a:endParaRPr lang="en-US" sz="3600" dirty="0">
+              <a:latin typeface="Georgia" panose="02040502050405020303" pitchFamily="18" charset="0"/>
+            </a:endParaRPr>
+          </a:p>
+          <a:p>
+            <a:pPr marL="571500" indent="-571500">
+              <a:buFont typeface="Wingdings" pitchFamily="2" charset="2"/>
+              <a:buChar char="q"/>
+            </a:pPr>
+            <a:r>
+              <a:rPr lang="en-US" sz="3600" dirty="0">
+                <a:latin typeface="Georgia" panose="02040502050405020303" pitchFamily="18" charset="0"/>
+              </a:rPr>
+              <a:t> Fear of Snakes</a:t>
+            </a:r>
+          </a:p>
+          <a:p>
+            <a:pPr marL="571500" indent="-571500">
+              <a:buFont typeface="Wingdings" pitchFamily="2" charset="2"/>
+              <a:buChar char="q"/>
+            </a:pPr>
+            <a:endParaRPr lang="en-US" sz="3600" dirty="0">
+              <a:latin typeface="Georgia" panose="02040502050405020303" pitchFamily="18" charset="0"/>
+            </a:endParaRPr>
+          </a:p>
+          <a:p>
+            <a:pPr marL="571500" indent="-571500">
+              <a:buFont typeface="Wingdings" pitchFamily="2" charset="2"/>
+              <a:buChar char="q"/>
+            </a:pPr>
+            <a:r>
+              <a:rPr lang="en-US" sz="3600" dirty="0">
+                <a:latin typeface="Georgia" panose="02040502050405020303" pitchFamily="18" charset="0"/>
+              </a:rPr>
+              <a:t> Fear of Spiders</a:t>
+            </a:r>
+          </a:p>
+          <a:p>
+            <a:pPr marL="571500" indent="-571500">
+              <a:buFont typeface="Wingdings" pitchFamily="2" charset="2"/>
+              <a:buChar char="q"/>
+            </a:pPr>
+            <a:endParaRPr lang="en-US" sz="3600" dirty="0">
+              <a:latin typeface="Georgia" panose="02040502050405020303" pitchFamily="18" charset="0"/>
+            </a:endParaRPr>
+          </a:p>
+          <a:p>
+            <a:pPr marL="571500" indent="-571500">
+              <a:buFont typeface="Wingdings" pitchFamily="2" charset="2"/>
+              <a:buChar char="q"/>
+            </a:pPr>
+            <a:r>
+              <a:rPr lang="en-US" sz="3600" dirty="0">
+                <a:latin typeface="Georgia" panose="02040502050405020303" pitchFamily="18" charset="0"/>
+              </a:rPr>
+              <a:t> Fear of Heights</a:t>
+            </a:r>
+          </a:p>
+          <a:p>
+            <a:endParaRPr lang="en-US" dirty="0"/>
+          </a:p>
+        </p:txBody>
+      </p:sp>
+    </p:spTree>
+    <p:extLst>
+      <p:ext uri="{BB962C8B-B14F-4D97-AF65-F5344CB8AC3E}">
+        <p14:creationId xmlns:p14="http://schemas.microsoft.com/office/powerpoint/2010/main" val="1257724517"/>
+      </p:ext>
+    </p:extLst>
+  </p:cSld>
+  <p:clrMapOvr>
+    <a:masterClrMapping/>
+  </p:clrMapOvr>
+</p:sld>
+</file>
+
+<file path=ppt/slides/slide6.xml><?xml version="1.0" encoding="utf-8"?>
+<p:sld xmlns:a="http://schemas.openxmlformats.org/drawingml/2006/main" xmlns:r="http://schemas.openxmlformats.org/officeDocument/2006/relationships" xmlns:p="http://schemas.openxmlformats.org/presentationml/2006/main">
+  <p:cSld>
+    <p:spTree>
+      <p:nvGrpSpPr>
+        <p:cNvPr id="1" name=""/>
+        <p:cNvGrpSpPr/>
+        <p:nvPr/>
+      </p:nvGrpSpPr>
+      <p:grpSpPr>
+        <a:xfrm>
+          <a:off x="0" y="0"/>
+          <a:ext cx="0" cy="0"/>
+          <a:chOff x="0" y="0"/>
+          <a:chExt cx="0" cy="0"/>
+        </a:xfrm>
+      </p:grpSpPr>
+      <p:sp>
+        <p:nvSpPr>
+          <p:cNvPr id="2" name="Title 1">
+            <a:extLst>
+              <a:ext uri="{FF2B5EF4-FFF2-40B4-BE49-F238E27FC236}">
+                <a16:creationId xmlns:a16="http://schemas.microsoft.com/office/drawing/2014/main" id="{3800003D-0090-9643-A9AC-EAF49C80FBDC}"/>
+              </a:ext>
+            </a:extLst>
+          </p:cNvPr>
+          <p:cNvSpPr txBox="1">
+            <a:spLocks/>
+          </p:cNvSpPr>
+          <p:nvPr/>
+        </p:nvSpPr>
+        <p:spPr>
+          <a:xfrm>
+            <a:off x="661738" y="1628773"/>
+            <a:ext cx="11239755" cy="4421631"/>
+          </a:xfrm>
+          <a:prstGeom prst="rect">
+            <a:avLst/>
+          </a:prstGeom>
+        </p:spPr>
+        <p:txBody>
+          <a:bodyPr>
+            <a:noAutofit/>
+          </a:bodyPr>
+          <a:lstStyle>
+            <a:lvl1pPr algn="l" defTabSz="914400" rtl="0" eaLnBrk="1" latinLnBrk="0" hangingPunct="1">
+              <a:lnSpc>
+                <a:spcPct val="90000"/>
+              </a:lnSpc>
+              <a:spcBef>
+                <a:spcPct val="0"/>
+              </a:spcBef>
+              <a:buNone/>
+              <a:defRPr sz="4700" i="0" kern="1200" spc="-50" baseline="0">
+                <a:solidFill>
+                  <a:schemeClr val="tx1">
+                    <a:lumMod val="75000"/>
+                    <a:lumOff val="25000"/>
+                  </a:schemeClr>
+                </a:solidFill>
+                <a:latin typeface="+mj-lt"/>
+                <a:ea typeface="+mj-ea"/>
+                <a:cs typeface="+mj-cs"/>
+              </a:defRPr>
+            </a:lvl1pPr>
+          </a:lstStyle>
+          <a:p>
+            <a:pPr marL="457200" indent="-457200">
+              <a:buFont typeface="Arial" panose="020B0604020202020204" pitchFamily="34" charset="0"/>
+              <a:buChar char="•"/>
+            </a:pPr>
+            <a:r>
+              <a:rPr lang="en-US" sz="3200" dirty="0">
+                <a:latin typeface="Georgia" panose="02040502050405020303" pitchFamily="18" charset="0"/>
+              </a:rPr>
+              <a:t>Removed rows with </a:t>
+            </a:r>
+          </a:p>
+          <a:p>
+            <a:r>
+              <a:rPr lang="en-US" sz="3200" dirty="0">
+                <a:latin typeface="Georgia" panose="02040502050405020303" pitchFamily="18" charset="0"/>
+              </a:rPr>
+              <a:t>	null values</a:t>
+            </a:r>
+          </a:p>
+          <a:p>
+            <a:endParaRPr lang="en-US" sz="3200" dirty="0"/>
+          </a:p>
+          <a:p>
+            <a:pPr marL="457200" indent="-457200">
+              <a:buFont typeface="Arial" panose="020B0604020202020204" pitchFamily="34" charset="0"/>
+              <a:buChar char="•"/>
+            </a:pPr>
+            <a:r>
+              <a:rPr lang="en-US" sz="3200" dirty="0">
+                <a:latin typeface="Georgia" panose="02040502050405020303" pitchFamily="18" charset="0"/>
+              </a:rPr>
+              <a:t>Ran logistic regression </a:t>
+            </a:r>
+          </a:p>
+          <a:p>
+            <a:r>
+              <a:rPr lang="en-US" sz="3200" dirty="0">
+                <a:latin typeface="Georgia" panose="02040502050405020303" pitchFamily="18" charset="0"/>
+              </a:rPr>
+              <a:t>	models</a:t>
+            </a:r>
+          </a:p>
+          <a:p>
+            <a:endParaRPr lang="en-US" sz="3200" dirty="0">
+              <a:latin typeface="Georgia" panose="02040502050405020303" pitchFamily="18" charset="0"/>
+            </a:endParaRPr>
+          </a:p>
+          <a:p>
+            <a:pPr marL="457200" indent="-457200">
+              <a:buFont typeface="Arial" panose="020B0604020202020204" pitchFamily="34" charset="0"/>
+              <a:buChar char="•"/>
+            </a:pPr>
+            <a:r>
+              <a:rPr lang="en-US" sz="3200" dirty="0">
+                <a:latin typeface="Georgia" panose="02040502050405020303" pitchFamily="18" charset="0"/>
+              </a:rPr>
+              <a:t>Reduced the scale from 5 responses to 3.</a:t>
+            </a:r>
+          </a:p>
+          <a:p>
+            <a:endParaRPr lang="en-US" sz="3200" dirty="0"/>
+          </a:p>
+          <a:p>
+            <a:pPr marL="457200" indent="-457200">
+              <a:buFont typeface="Arial" panose="020B0604020202020204" pitchFamily="34" charset="0"/>
+              <a:buChar char="•"/>
+            </a:pPr>
+            <a:r>
+              <a:rPr lang="en-US" sz="3200" dirty="0">
+                <a:latin typeface="Georgia" panose="02040502050405020303" pitchFamily="18" charset="0"/>
+              </a:rPr>
+              <a:t>Realized we want to see the coefficients and p-values for 	features in the models.</a:t>
+            </a:r>
+          </a:p>
+        </p:txBody>
+      </p:sp>
+      <p:sp>
+        <p:nvSpPr>
+          <p:cNvPr id="3" name="Title 1">
+            <a:extLst>
+              <a:ext uri="{FF2B5EF4-FFF2-40B4-BE49-F238E27FC236}">
+                <a16:creationId xmlns:a16="http://schemas.microsoft.com/office/drawing/2014/main" id="{994542CE-0A4A-174E-AF52-0E4F98C6136A}"/>
+              </a:ext>
+            </a:extLst>
+          </p:cNvPr>
+          <p:cNvSpPr txBox="1">
+            <a:spLocks/>
+          </p:cNvSpPr>
+          <p:nvPr/>
+        </p:nvSpPr>
+        <p:spPr>
+          <a:xfrm>
+            <a:off x="447675" y="302878"/>
+            <a:ext cx="10058400" cy="1450757"/>
+          </a:xfrm>
+          <a:prstGeom prst="rect">
+            <a:avLst/>
+          </a:prstGeom>
+        </p:spPr>
+        <p:txBody>
+          <a:bodyPr/>
+          <a:lstStyle>
+            <a:lvl1pPr algn="l" defTabSz="914400" rtl="0" eaLnBrk="1" latinLnBrk="0" hangingPunct="1">
+              <a:lnSpc>
+                <a:spcPct val="90000"/>
+              </a:lnSpc>
+              <a:spcBef>
+                <a:spcPct val="0"/>
+              </a:spcBef>
+              <a:buNone/>
+              <a:defRPr sz="4700" i="0" kern="1200" spc="-50" baseline="0">
+                <a:solidFill>
+                  <a:schemeClr val="tx1">
+                    <a:lumMod val="75000"/>
+                    <a:lumOff val="25000"/>
+                  </a:schemeClr>
+                </a:solidFill>
+                <a:latin typeface="+mj-lt"/>
+                <a:ea typeface="+mj-ea"/>
+                <a:cs typeface="+mj-cs"/>
+              </a:defRPr>
+            </a:lvl1pPr>
+          </a:lstStyle>
+          <a:p>
+            <a:r>
+              <a:rPr lang="en-US" dirty="0"/>
+              <a:t>Initial Data Filtering</a:t>
+            </a:r>
+          </a:p>
+        </p:txBody>
+      </p:sp>
+      <p:pic>
+        <p:nvPicPr>
+          <p:cNvPr id="5" name="Picture 4" descr="A screenshot of a cell phone&#10;&#10;Description automatically generated">
+            <a:extLst>
+              <a:ext uri="{FF2B5EF4-FFF2-40B4-BE49-F238E27FC236}">
+                <a16:creationId xmlns:a16="http://schemas.microsoft.com/office/drawing/2014/main" id="{0D71B6A8-EDFE-1C47-88DE-4C4152D454B2}"/>
+              </a:ext>
+            </a:extLst>
+          </p:cNvPr>
+          <p:cNvPicPr>
+            <a:picLocks noChangeAspect="1"/>
+          </p:cNvPicPr>
+          <p:nvPr/>
+        </p:nvPicPr>
+        <p:blipFill rotWithShape="1">
+          <a:blip r:embed="rId2">
+            <a:extLst>
+              <a:ext uri="{28A0092B-C50C-407E-A947-70E740481C1C}">
+                <a14:useLocalDpi xmlns:a14="http://schemas.microsoft.com/office/drawing/2010/main" val="0"/>
+              </a:ext>
+            </a:extLst>
+          </a:blip>
+          <a:srcRect r="26638"/>
+          <a:stretch/>
+        </p:blipFill>
+        <p:spPr>
+          <a:xfrm>
+            <a:off x="5488924" y="1276799"/>
+            <a:ext cx="6255401" cy="2648828"/>
+          </a:xfrm>
+          <a:prstGeom prst="rect">
+            <a:avLst/>
+          </a:prstGeom>
+        </p:spPr>
+      </p:pic>
+    </p:spTree>
+    <p:extLst>
+      <p:ext uri="{BB962C8B-B14F-4D97-AF65-F5344CB8AC3E}">
+        <p14:creationId xmlns:p14="http://schemas.microsoft.com/office/powerpoint/2010/main" val="1226635586"/>
+      </p:ext>
+    </p:extLst>
+  </p:cSld>
+  <p:clrMapOvr>
+    <a:masterClrMapping/>
+  </p:clrMapOvr>
+  <p:timing>
+    <p:tnLst>
+      <p:par>
+        <p:cTn id="1" dur="indefinite" restart="never" nodeType="tmRoot">
+          <p:childTnLst>
+            <p:seq concurrent="1" nextAc="seek">
+              <p:cTn id="2" dur="indefinite" nodeType="mainSeq">
+                <p:childTnLst>
+                  <p:par>
+                    <p:cTn id="3" fill="hold">
+                      <p:stCondLst>
+                        <p:cond delay="indefinite"/>
+                      </p:stCondLst>
+                      <p:childTnLst>
+                        <p:par>
+                          <p:cTn id="4" fill="hold">
+                            <p:stCondLst>
+                              <p:cond delay="0"/>
+                            </p:stCondLst>
+                            <p:childTnLst>
+                              <p:par>
+                                <p:cTn id="5" presetID="1" presetClass="entr" presetSubtype="0" fill="hold" nodeType="clickEffect">
+                                  <p:stCondLst>
+                                    <p:cond delay="0"/>
+                                  </p:stCondLst>
+                                  <p:childTnLst>
+                                    <p:set>
+                                      <p:cBhvr>
+                                        <p:cTn id="6" dur="1" fill="hold">
+                                          <p:stCondLst>
+                                            <p:cond delay="0"/>
+                                          </p:stCondLst>
+                                        </p:cTn>
+                                        <p:tgtEl>
+                                          <p:spTgt spid="2">
+                                            <p:txEl>
+                                              <p:pRg st="6" end="6"/>
+                                            </p:txEl>
+                                          </p:spTgt>
+                                        </p:tgtEl>
+                                        <p:attrNameLst>
+                                          <p:attrName>style.visibility</p:attrName>
+                                        </p:attrNameLst>
+                                      </p:cBhvr>
+                                      <p:to>
+                                        <p:strVal val="visible"/>
+                                      </p:to>
+                                    </p:set>
+                                  </p:childTnLst>
+                                </p:cTn>
+                              </p:par>
+                            </p:childTnLst>
+                          </p:cTn>
+                        </p:par>
+                      </p:childTnLst>
+                    </p:cTn>
+                  </p:par>
+                  <p:par>
+                    <p:cTn id="7" fill="hold">
+                      <p:stCondLst>
+                        <p:cond delay="indefinite"/>
+                      </p:stCondLst>
+                      <p:childTnLst>
+                        <p:par>
+                          <p:cTn id="8" fill="hold">
+                            <p:stCondLst>
+                              <p:cond delay="0"/>
+                            </p:stCondLst>
+                            <p:childTnLst>
+                              <p:par>
+                                <p:cTn id="9" presetID="1" presetClass="entr" presetSubtype="0" fill="hold" nodeType="clickEffect">
+                                  <p:stCondLst>
+                                    <p:cond delay="0"/>
+                                  </p:stCondLst>
+                                  <p:childTnLst>
+                                    <p:set>
+                                      <p:cBhvr>
+                                        <p:cTn id="10" dur="1" fill="hold">
+                                          <p:stCondLst>
+                                            <p:cond delay="0"/>
+                                          </p:stCondLst>
+                                        </p:cTn>
+                                        <p:tgtEl>
+                                          <p:spTgt spid="2">
+                                            <p:txEl>
+                                              <p:pRg st="8" end="8"/>
+                                            </p:txEl>
+                                          </p:spTgt>
+                                        </p:tgtEl>
+                                        <p:attrNameLst>
+                                          <p:attrName>style.visibility</p:attrName>
+                                        </p:attrNameLst>
+                                      </p:cBhvr>
+                                      <p:to>
+                                        <p:strVal val="visible"/>
+                                      </p:to>
+                                    </p:set>
+                                  </p:childTnLst>
+                                </p:cTn>
+                              </p:par>
+                            </p:childTnLst>
+                          </p:cTn>
+                        </p:par>
+                      </p:childTnLst>
+                    </p:cTn>
+                  </p:par>
+                </p:childTnLst>
+              </p:cTn>
+              <p:prevCondLst>
+                <p:cond evt="onPrev" delay="0">
+                  <p:tgtEl>
+                    <p:sldTgt/>
+                  </p:tgtEl>
+                </p:cond>
+              </p:prevCondLst>
+              <p:nextCondLst>
+                <p:cond evt="onNext" delay="0">
+                  <p:tgtEl>
+                    <p:sldTgt/>
+                  </p:tgtEl>
+                </p:cond>
+              </p:nextCondLst>
+            </p:seq>
+          </p:childTnLst>
+        </p:cTn>
+      </p:par>
+    </p:tnLst>
+  </p:timing>
+</p:sld>
+</file>
+
+<file path=ppt/slides/slide7.xml><?xml version="1.0" encoding="utf-8"?>
+<p:sld xmlns:a="http://schemas.openxmlformats.org/drawingml/2006/main" xmlns:r="http://schemas.openxmlformats.org/officeDocument/2006/relationships" xmlns:p="http://schemas.openxmlformats.org/presentationml/2006/main">
+  <p:cSld>
+    <p:spTree>
+      <p:nvGrpSpPr>
+        <p:cNvPr id="1" name=""/>
+        <p:cNvGrpSpPr/>
+        <p:nvPr/>
+      </p:nvGrpSpPr>
+      <p:grpSpPr>
+        <a:xfrm>
+          <a:off x="0" y="0"/>
+          <a:ext cx="0" cy="0"/>
+          <a:chOff x="0" y="0"/>
+          <a:chExt cx="0" cy="0"/>
+        </a:xfrm>
+      </p:grpSpPr>
+      <p:sp>
+        <p:nvSpPr>
+          <p:cNvPr id="8" name="Rectangle 7">
+            <a:extLst>
+              <a:ext uri="{FF2B5EF4-FFF2-40B4-BE49-F238E27FC236}">
+                <a16:creationId xmlns:a16="http://schemas.microsoft.com/office/drawing/2014/main" id="{3FCCA7F6-4E42-724E-9C71-5BE6C5558079}"/>
+              </a:ext>
+            </a:extLst>
+          </p:cNvPr>
+          <p:cNvSpPr/>
+          <p:nvPr/>
+        </p:nvSpPr>
+        <p:spPr>
+          <a:xfrm>
+            <a:off x="0" y="0"/>
+            <a:ext cx="12192000" cy="4903453"/>
           </a:xfrm>
           <a:prstGeom prst="rect">
             <a:avLst/>
           </a:prstGeom>
           <a:solidFill>
-            <a:schemeClr val="accent1"/>
+            <a:schemeClr val="accent1">
+              <a:lumMod val="60000"/>
+              <a:lumOff val="40000"/>
+            </a:schemeClr>
           </a:solidFill>
-          <a:ln>
-            <a:noFill/>
-          </a:ln>
         </p:spPr>
         <p:style>
           <a:lnRef idx="2">
@@ -4996,10 +7377,10 @@
       </p:sp>
       <p:sp>
         <p:nvSpPr>
-          <p:cNvPr id="2" name="Title 1">
+          <p:cNvPr id="3" name="Title 2">
             <a:extLst>
               <a:ext uri="{FF2B5EF4-FFF2-40B4-BE49-F238E27FC236}">
-                <a16:creationId xmlns:a16="http://schemas.microsoft.com/office/drawing/2014/main" id="{9AB2EA78-AEB3-469B-9025-3B17201A457B}"/>
+                <a16:creationId xmlns:a16="http://schemas.microsoft.com/office/drawing/2014/main" id="{6BE0F994-C4E0-B747-885D-B24CA8C7D70B}"/>
               </a:ext>
             </a:extLst>
           </p:cNvPr>
@@ -5007,70 +7388,275 @@
             <a:spLocks noGrp="1"/>
           </p:cNvSpPr>
           <p:nvPr>
-            <p:ph type="ctrTitle"/>
+            <p:ph type="title"/>
           </p:nvPr>
         </p:nvSpPr>
         <p:spPr>
           <a:xfrm>
-            <a:off x="1097280" y="758952"/>
-            <a:ext cx="10058400" cy="3892168"/>
+            <a:off x="447675" y="4783882"/>
+            <a:ext cx="10113645" cy="743682"/>
           </a:xfrm>
         </p:spPr>
         <p:txBody>
-          <a:bodyPr anchor="ctr">
-            <a:normAutofit/>
-          </a:bodyPr>
+          <a:bodyPr/>
           <a:lstStyle/>
           <a:p>
-            <a:pPr lvl="0"/>
-            <a:r>
-              <a:rPr lang="en-US" sz="4800" i="1" dirty="0">
-                <a:solidFill>
-                  <a:srgbClr val="FFFFFF"/>
-                </a:solidFill>
-              </a:rPr>
-              <a:t>Your best quote that reflects your approach… “It’s one small step for man, one giant leap for mankind.”</a:t>
-            </a:r>
-          </a:p>
-        </p:txBody>
-      </p:sp>
-      <p:sp>
-        <p:nvSpPr>
-          <p:cNvPr id="49" name="Rectangle 48">
+            <a:r>
+              <a:rPr lang="en-CA" dirty="0"/>
+              <a:t>Logistic regression</a:t>
+            </a:r>
+            <a:endParaRPr lang="en-US" dirty="0"/>
+          </a:p>
+        </p:txBody>
+      </p:sp>
+      <p:sp>
+        <p:nvSpPr>
+          <p:cNvPr id="4" name="Text Placeholder 3">
             <a:extLst>
               <a:ext uri="{FF2B5EF4-FFF2-40B4-BE49-F238E27FC236}">
-                <a16:creationId xmlns:a16="http://schemas.microsoft.com/office/drawing/2014/main" id="{4260EDE0-989C-4E16-AF94-F652294D828E}"/>
-              </a:ext>
-              <a:ext uri="{C183D7F6-B498-43B3-948B-1728B52AA6E4}">
-                <adec:decorative xmlns:adec="http://schemas.microsoft.com/office/drawing/2017/decorative" val="1"/>
+                <a16:creationId xmlns:a16="http://schemas.microsoft.com/office/drawing/2014/main" id="{3D32C07B-390C-0E41-8348-87C1D1864AE9}"/>
               </a:ext>
             </a:extLst>
           </p:cNvPr>
           <p:cNvSpPr>
-            <a:spLocks noGrp="1" noRot="1" noChangeAspect="1" noMove="1" noResize="1" noEditPoints="1" noAdjustHandles="1" noChangeArrowheads="1" noChangeShapeType="1" noTextEdit="1"/>
+            <a:spLocks noGrp="1"/>
           </p:cNvSpPr>
           <p:nvPr>
-            <p:extLst>
-              <p:ext uri="{386F3935-93C4-4BCD-93E2-E3B085C9AB24}">
-                <p16:designElem xmlns:p16="http://schemas.microsoft.com/office/powerpoint/2015/main" val="1"/>
-              </p:ext>
-            </p:extLst>
+            <p:ph type="body" sz="half" idx="2"/>
           </p:nvPr>
         </p:nvSpPr>
-        <p:spPr bwMode="white">
+        <p:spPr>
           <a:xfrm>
-            <a:off x="1507" y="4953000"/>
-            <a:ext cx="12188952" cy="1905000"/>
+            <a:off x="738464" y="5592952"/>
+            <a:ext cx="10113264" cy="413653"/>
+          </a:xfrm>
+        </p:spPr>
+        <p:txBody>
+          <a:bodyPr/>
+          <a:lstStyle/>
+          <a:p>
+            <a:r>
+              <a:rPr lang="en-US" dirty="0" err="1">
+                <a:latin typeface="Georgia" panose="02040502050405020303" pitchFamily="18" charset="0"/>
+              </a:rPr>
+              <a:t>Y’all</a:t>
+            </a:r>
+            <a:r>
+              <a:rPr lang="en-US" dirty="0">
+                <a:latin typeface="Georgia" panose="02040502050405020303" pitchFamily="18" charset="0"/>
+              </a:rPr>
+              <a:t> remember this one.</a:t>
+            </a:r>
+          </a:p>
+        </p:txBody>
+      </p:sp>
+      <p:sp>
+        <p:nvSpPr>
+          <p:cNvPr id="5" name="Title 1">
+            <a:extLst>
+              <a:ext uri="{FF2B5EF4-FFF2-40B4-BE49-F238E27FC236}">
+                <a16:creationId xmlns:a16="http://schemas.microsoft.com/office/drawing/2014/main" id="{254A8102-9C1D-4B42-88F0-62CB84233842}"/>
+              </a:ext>
+            </a:extLst>
+          </p:cNvPr>
+          <p:cNvSpPr txBox="1">
+            <a:spLocks/>
+          </p:cNvSpPr>
+          <p:nvPr/>
+        </p:nvSpPr>
+        <p:spPr>
+          <a:xfrm>
+            <a:off x="447675" y="302878"/>
+            <a:ext cx="10058400" cy="1450757"/>
+          </a:xfrm>
+          <a:prstGeom prst="rect">
+            <a:avLst/>
+          </a:prstGeom>
+        </p:spPr>
+        <p:txBody>
+          <a:bodyPr/>
+          <a:lstStyle>
+            <a:lvl1pPr algn="l" defTabSz="914400" rtl="0" eaLnBrk="1" latinLnBrk="0" hangingPunct="1">
+              <a:lnSpc>
+                <a:spcPct val="90000"/>
+              </a:lnSpc>
+              <a:spcBef>
+                <a:spcPct val="0"/>
+              </a:spcBef>
+              <a:buNone/>
+              <a:defRPr sz="4700" i="0" kern="1200" spc="-50" baseline="0">
+                <a:solidFill>
+                  <a:schemeClr val="tx1">
+                    <a:lumMod val="75000"/>
+                    <a:lumOff val="25000"/>
+                  </a:schemeClr>
+                </a:solidFill>
+                <a:latin typeface="+mj-lt"/>
+                <a:ea typeface="+mj-ea"/>
+                <a:cs typeface="+mj-cs"/>
+              </a:defRPr>
+            </a:lvl1pPr>
+          </a:lstStyle>
+          <a:p>
+            <a:r>
+              <a:rPr lang="en-US" dirty="0"/>
+              <a:t>Initial Data Filtering</a:t>
+            </a:r>
+          </a:p>
+        </p:txBody>
+      </p:sp>
+      <p:pic>
+        <p:nvPicPr>
+          <p:cNvPr id="28" name="Picture 27" descr="A screenshot of a cell phone&#10;&#10;Description automatically generated">
+            <a:extLst>
+              <a:ext uri="{FF2B5EF4-FFF2-40B4-BE49-F238E27FC236}">
+                <a16:creationId xmlns:a16="http://schemas.microsoft.com/office/drawing/2014/main" id="{8AE534BC-59A3-2B46-B128-1A6C8448A84A}"/>
+              </a:ext>
+            </a:extLst>
+          </p:cNvPr>
+          <p:cNvPicPr>
+            <a:picLocks noChangeAspect="1"/>
+          </p:cNvPicPr>
+          <p:nvPr/>
+        </p:nvPicPr>
+        <p:blipFill>
+          <a:blip r:embed="rId2">
+            <a:extLst>
+              <a:ext uri="{28A0092B-C50C-407E-A947-70E740481C1C}">
+                <a14:useLocalDpi xmlns:a14="http://schemas.microsoft.com/office/drawing/2010/main" val="0"/>
+              </a:ext>
+            </a:extLst>
+          </a:blip>
+          <a:stretch>
+            <a:fillRect/>
+          </a:stretch>
+        </p:blipFill>
+        <p:spPr>
+          <a:xfrm>
+            <a:off x="1328483" y="1125065"/>
+            <a:ext cx="9535034" cy="3559746"/>
+          </a:xfrm>
+          <a:prstGeom prst="rect">
+            <a:avLst/>
+          </a:prstGeom>
+        </p:spPr>
+      </p:pic>
+    </p:spTree>
+    <p:extLst>
+      <p:ext uri="{BB962C8B-B14F-4D97-AF65-F5344CB8AC3E}">
+        <p14:creationId xmlns:p14="http://schemas.microsoft.com/office/powerpoint/2010/main" val="3804577336"/>
+      </p:ext>
+    </p:extLst>
+  </p:cSld>
+  <p:clrMapOvr>
+    <a:masterClrMapping/>
+  </p:clrMapOvr>
+</p:sld>
+</file>
+
+<file path=ppt/slides/slide8.xml><?xml version="1.0" encoding="utf-8"?>
+<p:sld xmlns:a="http://schemas.openxmlformats.org/drawingml/2006/main" xmlns:r="http://schemas.openxmlformats.org/officeDocument/2006/relationships" xmlns:p="http://schemas.openxmlformats.org/presentationml/2006/main">
+  <p:cSld>
+    <p:spTree>
+      <p:nvGrpSpPr>
+        <p:cNvPr id="1" name=""/>
+        <p:cNvGrpSpPr/>
+        <p:nvPr/>
+      </p:nvGrpSpPr>
+      <p:grpSpPr>
+        <a:xfrm>
+          <a:off x="0" y="0"/>
+          <a:ext cx="0" cy="0"/>
+          <a:chOff x="0" y="0"/>
+          <a:chExt cx="0" cy="0"/>
+        </a:xfrm>
+      </p:grpSpPr>
+      <p:pic>
+        <p:nvPicPr>
+          <p:cNvPr id="3" name="Picture 2">
+            <a:extLst>
+              <a:ext uri="{FF2B5EF4-FFF2-40B4-BE49-F238E27FC236}">
+                <a16:creationId xmlns:a16="http://schemas.microsoft.com/office/drawing/2014/main" id="{56CF2FF6-02B3-0749-A8B5-7AE5598EB07C}"/>
+              </a:ext>
+            </a:extLst>
+          </p:cNvPr>
+          <p:cNvPicPr>
+            <a:picLocks noChangeAspect="1"/>
+          </p:cNvPicPr>
+          <p:nvPr/>
+        </p:nvPicPr>
+        <p:blipFill>
+          <a:blip r:embed="rId2"/>
+          <a:stretch>
+            <a:fillRect/>
+          </a:stretch>
+        </p:blipFill>
+        <p:spPr>
+          <a:xfrm>
+            <a:off x="3037219" y="277812"/>
+            <a:ext cx="6117561" cy="5894388"/>
+          </a:xfrm>
+          <a:prstGeom prst="rect">
+            <a:avLst/>
+          </a:prstGeom>
+        </p:spPr>
+      </p:pic>
+    </p:spTree>
+    <p:extLst>
+      <p:ext uri="{BB962C8B-B14F-4D97-AF65-F5344CB8AC3E}">
+        <p14:creationId xmlns:p14="http://schemas.microsoft.com/office/powerpoint/2010/main" val="646292006"/>
+      </p:ext>
+    </p:extLst>
+  </p:cSld>
+  <p:clrMapOvr>
+    <a:masterClrMapping/>
+  </p:clrMapOvr>
+</p:sld>
+</file>
+
+<file path=ppt/slides/slide9.xml><?xml version="1.0" encoding="utf-8"?>
+<p:sld xmlns:a="http://schemas.openxmlformats.org/drawingml/2006/main" xmlns:r="http://schemas.openxmlformats.org/officeDocument/2006/relationships" xmlns:p="http://schemas.openxmlformats.org/presentationml/2006/main">
+  <p:cSld>
+    <p:spTree>
+      <p:nvGrpSpPr>
+        <p:cNvPr id="1" name=""/>
+        <p:cNvGrpSpPr/>
+        <p:nvPr/>
+      </p:nvGrpSpPr>
+      <p:grpSpPr>
+        <a:xfrm>
+          <a:off x="0" y="0"/>
+          <a:ext cx="0" cy="0"/>
+          <a:chOff x="0" y="0"/>
+          <a:chExt cx="0" cy="0"/>
+        </a:xfrm>
+      </p:grpSpPr>
+      <p:sp>
+        <p:nvSpPr>
+          <p:cNvPr id="8" name="Rectangle 7">
+            <a:extLst>
+              <a:ext uri="{FF2B5EF4-FFF2-40B4-BE49-F238E27FC236}">
+                <a16:creationId xmlns:a16="http://schemas.microsoft.com/office/drawing/2014/main" id="{3FCCA7F6-4E42-724E-9C71-5BE6C5558079}"/>
+              </a:ext>
+            </a:extLst>
+          </p:cNvPr>
+          <p:cNvSpPr/>
+          <p:nvPr/>
+        </p:nvSpPr>
+        <p:spPr>
+          <a:xfrm>
+            <a:off x="0" y="0"/>
+            <a:ext cx="12192000" cy="4903453"/>
           </a:xfrm>
           <a:prstGeom prst="rect">
             <a:avLst/>
           </a:prstGeom>
           <a:solidFill>
-            <a:srgbClr val="262626"/>
+            <a:schemeClr val="accent1">
+              <a:lumMod val="60000"/>
+              <a:lumOff val="40000"/>
+            </a:schemeClr>
           </a:solidFill>
-          <a:ln>
-            <a:noFill/>
-          </a:ln>
         </p:spPr>
         <p:style>
           <a:lnRef idx="2">
@@ -5088,13 +7674,21 @@
             <a:schemeClr val="lt1"/>
           </a:fontRef>
         </p:style>
-      </p:sp>
-      <p:sp>
-        <p:nvSpPr>
-          <p:cNvPr id="3" name="Subtitle 2">
+        <p:txBody>
+          <a:bodyPr rtlCol="0" anchor="ctr"/>
+          <a:lstStyle/>
+          <a:p>
+            <a:pPr algn="ctr"/>
+            <a:endParaRPr lang="en-US"/>
+          </a:p>
+        </p:txBody>
+      </p:sp>
+      <p:sp>
+        <p:nvSpPr>
+          <p:cNvPr id="3" name="Title 2">
             <a:extLst>
               <a:ext uri="{FF2B5EF4-FFF2-40B4-BE49-F238E27FC236}">
-                <a16:creationId xmlns:a16="http://schemas.microsoft.com/office/drawing/2014/main" id="{255E1F2F-E259-4EA8-9FFD-3A10AF541859}"/>
+                <a16:creationId xmlns:a16="http://schemas.microsoft.com/office/drawing/2014/main" id="{6BE0F994-C4E0-B747-885D-B24CA8C7D70B}"/>
               </a:ext>
             </a:extLst>
           </p:cNvPr>
@@ -5102,42 +7696,467 @@
             <a:spLocks noGrp="1"/>
           </p:cNvSpPr>
           <p:nvPr>
-            <p:ph type="subTitle" idx="1"/>
+            <p:ph type="title"/>
           </p:nvPr>
         </p:nvSpPr>
         <p:spPr>
           <a:xfrm>
-            <a:off x="1100051" y="5225240"/>
-            <a:ext cx="10058400" cy="1143000"/>
+            <a:off x="447675" y="4783882"/>
+            <a:ext cx="10113645" cy="743682"/>
           </a:xfrm>
         </p:spPr>
         <p:txBody>
-          <a:bodyPr>
-            <a:normAutofit/>
-          </a:bodyPr>
+          <a:bodyPr/>
           <a:lstStyle/>
           <a:p>
             <a:r>
+              <a:rPr lang="en-CA" dirty="0"/>
+              <a:t>Proportional odds logistic regression</a:t>
+            </a:r>
+            <a:endParaRPr lang="en-US" dirty="0"/>
+          </a:p>
+        </p:txBody>
+      </p:sp>
+      <p:sp>
+        <p:nvSpPr>
+          <p:cNvPr id="4" name="Text Placeholder 3">
+            <a:extLst>
+              <a:ext uri="{FF2B5EF4-FFF2-40B4-BE49-F238E27FC236}">
+                <a16:creationId xmlns:a16="http://schemas.microsoft.com/office/drawing/2014/main" id="{3D32C07B-390C-0E41-8348-87C1D1864AE9}"/>
+              </a:ext>
+            </a:extLst>
+          </p:cNvPr>
+          <p:cNvSpPr>
+            <a:spLocks noGrp="1"/>
+          </p:cNvSpPr>
+          <p:nvPr>
+            <p:ph type="body" sz="half" idx="2"/>
+          </p:nvPr>
+        </p:nvSpPr>
+        <p:spPr>
+          <a:xfrm>
+            <a:off x="738464" y="5592952"/>
+            <a:ext cx="10113264" cy="413653"/>
+          </a:xfrm>
+        </p:spPr>
+        <p:txBody>
+          <a:bodyPr/>
+          <a:lstStyle/>
+          <a:p>
+            <a:r>
               <a:rPr lang="en-US" dirty="0">
+                <a:latin typeface="Georgia" panose="02040502050405020303" pitchFamily="18" charset="0"/>
+              </a:rPr>
+              <a:t>For a target of ordered responses and the distance between each response may not be equal.</a:t>
+            </a:r>
+          </a:p>
+        </p:txBody>
+      </p:sp>
+      <p:sp>
+        <p:nvSpPr>
+          <p:cNvPr id="5" name="Title 1">
+            <a:extLst>
+              <a:ext uri="{FF2B5EF4-FFF2-40B4-BE49-F238E27FC236}">
+                <a16:creationId xmlns:a16="http://schemas.microsoft.com/office/drawing/2014/main" id="{254A8102-9C1D-4B42-88F0-62CB84233842}"/>
+              </a:ext>
+            </a:extLst>
+          </p:cNvPr>
+          <p:cNvSpPr txBox="1">
+            <a:spLocks/>
+          </p:cNvSpPr>
+          <p:nvPr/>
+        </p:nvSpPr>
+        <p:spPr>
+          <a:xfrm>
+            <a:off x="447675" y="302878"/>
+            <a:ext cx="10058400" cy="1450757"/>
+          </a:xfrm>
+          <a:prstGeom prst="rect">
+            <a:avLst/>
+          </a:prstGeom>
+        </p:spPr>
+        <p:txBody>
+          <a:bodyPr/>
+          <a:lstStyle>
+            <a:lvl1pPr algn="l" defTabSz="914400" rtl="0" eaLnBrk="1" latinLnBrk="0" hangingPunct="1">
+              <a:lnSpc>
+                <a:spcPct val="90000"/>
+              </a:lnSpc>
+              <a:spcBef>
+                <a:spcPct val="0"/>
+              </a:spcBef>
+              <a:buNone/>
+              <a:defRPr sz="4700" i="0" kern="1200" spc="-50" baseline="0">
                 <a:solidFill>
-                  <a:srgbClr val="FFFFFF"/>
+                  <a:schemeClr val="tx1">
+                    <a:lumMod val="75000"/>
+                    <a:lumOff val="25000"/>
+                  </a:schemeClr>
                 </a:solidFill>
-              </a:rPr>
-              <a:t>- Neil Armstrong</a:t>
-            </a:r>
-          </a:p>
-        </p:txBody>
-      </p:sp>
+                <a:latin typeface="+mj-lt"/>
+                <a:ea typeface="+mj-ea"/>
+                <a:cs typeface="+mj-cs"/>
+              </a:defRPr>
+            </a:lvl1pPr>
+          </a:lstStyle>
+          <a:p>
+            <a:r>
+              <a:rPr lang="en-US" dirty="0"/>
+              <a:t>Initial Data Filtering</a:t>
+            </a:r>
+          </a:p>
+        </p:txBody>
+      </p:sp>
+      <p:pic>
+        <p:nvPicPr>
+          <p:cNvPr id="13" name="Picture 12" descr="A screenshot of a social media post&#10;&#10;Description automatically generated">
+            <a:extLst>
+              <a:ext uri="{FF2B5EF4-FFF2-40B4-BE49-F238E27FC236}">
+                <a16:creationId xmlns:a16="http://schemas.microsoft.com/office/drawing/2014/main" id="{0AD83BB2-7BCE-954B-A96A-A2FE681A925D}"/>
+              </a:ext>
+            </a:extLst>
+          </p:cNvPr>
+          <p:cNvPicPr>
+            <a:picLocks noChangeAspect="1"/>
+          </p:cNvPicPr>
+          <p:nvPr/>
+        </p:nvPicPr>
+        <p:blipFill>
+          <a:blip r:embed="rId2">
+            <a:extLst>
+              <a:ext uri="{28A0092B-C50C-407E-A947-70E740481C1C}">
+                <a14:useLocalDpi xmlns:a14="http://schemas.microsoft.com/office/drawing/2010/main" val="0"/>
+              </a:ext>
+            </a:extLst>
+          </a:blip>
+          <a:stretch>
+            <a:fillRect/>
+          </a:stretch>
+        </p:blipFill>
+        <p:spPr>
+          <a:xfrm>
+            <a:off x="1562522" y="1184100"/>
+            <a:ext cx="9066955" cy="3512756"/>
+          </a:xfrm>
+          <a:prstGeom prst="rect">
+            <a:avLst/>
+          </a:prstGeom>
+        </p:spPr>
+      </p:pic>
+      <p:grpSp>
+        <p:nvGrpSpPr>
+          <p:cNvPr id="24" name="Group 23">
+            <a:extLst>
+              <a:ext uri="{FF2B5EF4-FFF2-40B4-BE49-F238E27FC236}">
+                <a16:creationId xmlns:a16="http://schemas.microsoft.com/office/drawing/2014/main" id="{1280966E-94A1-0341-BE8B-1A3A8ED9F370}"/>
+              </a:ext>
+            </a:extLst>
+          </p:cNvPr>
+          <p:cNvGrpSpPr/>
+          <p:nvPr/>
+        </p:nvGrpSpPr>
+        <p:grpSpPr>
+          <a:xfrm>
+            <a:off x="1594065" y="5895049"/>
+            <a:ext cx="10071693" cy="890905"/>
+            <a:chOff x="1594065" y="5895049"/>
+            <a:chExt cx="10071693" cy="890905"/>
+          </a:xfrm>
+        </p:grpSpPr>
+        <p:sp>
+          <p:nvSpPr>
+            <p:cNvPr id="15" name="TextBox 14">
+              <a:extLst>
+                <a:ext uri="{FF2B5EF4-FFF2-40B4-BE49-F238E27FC236}">
+                  <a16:creationId xmlns:a16="http://schemas.microsoft.com/office/drawing/2014/main" id="{DC416779-6840-2940-9A51-5D380BF22AC1}"/>
+                </a:ext>
+              </a:extLst>
+            </p:cNvPr>
+            <p:cNvSpPr txBox="1"/>
+            <p:nvPr/>
+          </p:nvSpPr>
+          <p:spPr>
+            <a:xfrm>
+              <a:off x="1594065" y="6324289"/>
+              <a:ext cx="1632030" cy="461665"/>
+            </a:xfrm>
+            <a:prstGeom prst="rect">
+              <a:avLst/>
+            </a:prstGeom>
+            <a:noFill/>
+          </p:spPr>
+          <p:txBody>
+            <a:bodyPr wrap="square" rtlCol="0">
+              <a:spAutoFit/>
+            </a:bodyPr>
+            <a:lstStyle/>
+            <a:p>
+              <a:r>
+                <a:rPr lang="en-US" sz="2400" dirty="0">
+                  <a:solidFill>
+                    <a:schemeClr val="bg1"/>
+                  </a:solidFill>
+                  <a:latin typeface="Georgia" panose="02040502050405020303" pitchFamily="18" charset="0"/>
+                </a:rPr>
+                <a:t>Not Afraid</a:t>
+              </a:r>
+            </a:p>
+          </p:txBody>
+        </p:sp>
+        <p:sp>
+          <p:nvSpPr>
+            <p:cNvPr id="16" name="TextBox 15">
+              <a:extLst>
+                <a:ext uri="{FF2B5EF4-FFF2-40B4-BE49-F238E27FC236}">
+                  <a16:creationId xmlns:a16="http://schemas.microsoft.com/office/drawing/2014/main" id="{F8A47A10-7241-7E4C-84EB-55A7CEE03343}"/>
+                </a:ext>
+              </a:extLst>
+            </p:cNvPr>
+            <p:cNvSpPr txBox="1"/>
+            <p:nvPr/>
+          </p:nvSpPr>
+          <p:spPr>
+            <a:xfrm>
+              <a:off x="5476875" y="6093456"/>
+              <a:ext cx="1271287" cy="461665"/>
+            </a:xfrm>
+            <a:prstGeom prst="rect">
+              <a:avLst/>
+            </a:prstGeom>
+            <a:noFill/>
+          </p:spPr>
+          <p:txBody>
+            <a:bodyPr wrap="square" rtlCol="0">
+              <a:spAutoFit/>
+            </a:bodyPr>
+            <a:lstStyle/>
+            <a:p>
+              <a:r>
+                <a:rPr lang="en-US" sz="2400" dirty="0">
+                  <a:solidFill>
+                    <a:schemeClr val="bg1"/>
+                  </a:solidFill>
+                  <a:latin typeface="Georgia" panose="02040502050405020303" pitchFamily="18" charset="0"/>
+                </a:rPr>
+                <a:t>Neutral</a:t>
+              </a:r>
+            </a:p>
+          </p:txBody>
+        </p:sp>
+        <p:sp>
+          <p:nvSpPr>
+            <p:cNvPr id="19" name="TextBox 18">
+              <a:extLst>
+                <a:ext uri="{FF2B5EF4-FFF2-40B4-BE49-F238E27FC236}">
+                  <a16:creationId xmlns:a16="http://schemas.microsoft.com/office/drawing/2014/main" id="{D0AAE70E-66A5-8647-B2E0-BEC9A7682934}"/>
+                </a:ext>
+              </a:extLst>
+            </p:cNvPr>
+            <p:cNvSpPr txBox="1"/>
+            <p:nvPr/>
+          </p:nvSpPr>
+          <p:spPr>
+            <a:xfrm>
+              <a:off x="10438613" y="5895049"/>
+              <a:ext cx="1227145" cy="461665"/>
+            </a:xfrm>
+            <a:prstGeom prst="rect">
+              <a:avLst/>
+            </a:prstGeom>
+            <a:noFill/>
+          </p:spPr>
+          <p:txBody>
+            <a:bodyPr wrap="square" rtlCol="0">
+              <a:spAutoFit/>
+            </a:bodyPr>
+            <a:lstStyle/>
+            <a:p>
+              <a:r>
+                <a:rPr lang="en-US" sz="2400" dirty="0">
+                  <a:solidFill>
+                    <a:schemeClr val="bg1"/>
+                  </a:solidFill>
+                  <a:latin typeface="Georgia" panose="02040502050405020303" pitchFamily="18" charset="0"/>
+                </a:rPr>
+                <a:t>Afraid</a:t>
+              </a:r>
+            </a:p>
+          </p:txBody>
+        </p:sp>
+        <p:sp>
+          <p:nvSpPr>
+            <p:cNvPr id="20" name="Left-Right Arrow 19">
+              <a:extLst>
+                <a:ext uri="{FF2B5EF4-FFF2-40B4-BE49-F238E27FC236}">
+                  <a16:creationId xmlns:a16="http://schemas.microsoft.com/office/drawing/2014/main" id="{E6DFDFB6-C7DB-A548-BF9E-1457E531BF2C}"/>
+                </a:ext>
+              </a:extLst>
+            </p:cNvPr>
+            <p:cNvSpPr/>
+            <p:nvPr/>
+          </p:nvSpPr>
+          <p:spPr>
+            <a:xfrm rot="21251136">
+              <a:off x="3203481" y="6256819"/>
+              <a:ext cx="2299892" cy="358569"/>
+            </a:xfrm>
+            <a:prstGeom prst="leftRightArrow">
+              <a:avLst/>
+            </a:prstGeom>
+          </p:spPr>
+          <p:style>
+            <a:lnRef idx="1">
+              <a:schemeClr val="accent3"/>
+            </a:lnRef>
+            <a:fillRef idx="2">
+              <a:schemeClr val="accent3"/>
+            </a:fillRef>
+            <a:effectRef idx="1">
+              <a:schemeClr val="accent3"/>
+            </a:effectRef>
+            <a:fontRef idx="minor">
+              <a:schemeClr val="dk1"/>
+            </a:fontRef>
+          </p:style>
+          <p:txBody>
+            <a:bodyPr rtlCol="0" anchor="ctr"/>
+            <a:lstStyle/>
+            <a:p>
+              <a:pPr algn="ctr"/>
+              <a:endParaRPr lang="en-US"/>
+            </a:p>
+          </p:txBody>
+        </p:sp>
+        <p:sp>
+          <p:nvSpPr>
+            <p:cNvPr id="23" name="Left-Right Arrow 22">
+              <a:extLst>
+                <a:ext uri="{FF2B5EF4-FFF2-40B4-BE49-F238E27FC236}">
+                  <a16:creationId xmlns:a16="http://schemas.microsoft.com/office/drawing/2014/main" id="{90DD0F0B-F889-6B49-8507-CC55074AA6EE}"/>
+                </a:ext>
+              </a:extLst>
+            </p:cNvPr>
+            <p:cNvSpPr/>
+            <p:nvPr/>
+          </p:nvSpPr>
+          <p:spPr>
+            <a:xfrm rot="10637863" flipH="1" flipV="1">
+              <a:off x="6750574" y="6147165"/>
+              <a:ext cx="3723094" cy="198271"/>
+            </a:xfrm>
+            <a:prstGeom prst="leftRightArrow">
+              <a:avLst/>
+            </a:prstGeom>
+          </p:spPr>
+          <p:style>
+            <a:lnRef idx="1">
+              <a:schemeClr val="accent3"/>
+            </a:lnRef>
+            <a:fillRef idx="2">
+              <a:schemeClr val="accent3"/>
+            </a:fillRef>
+            <a:effectRef idx="1">
+              <a:schemeClr val="accent3"/>
+            </a:effectRef>
+            <a:fontRef idx="minor">
+              <a:schemeClr val="dk1"/>
+            </a:fontRef>
+          </p:style>
+          <p:txBody>
+            <a:bodyPr rtlCol="0" anchor="ctr"/>
+            <a:lstStyle/>
+            <a:p>
+              <a:pPr algn="ctr"/>
+              <a:endParaRPr lang="en-US"/>
+            </a:p>
+          </p:txBody>
+        </p:sp>
+      </p:grpSp>
     </p:spTree>
     <p:extLst>
       <p:ext uri="{BB962C8B-B14F-4D97-AF65-F5344CB8AC3E}">
-        <p14:creationId xmlns:p14="http://schemas.microsoft.com/office/powerpoint/2010/main" val="191714609"/>
+        <p14:creationId xmlns:p14="http://schemas.microsoft.com/office/powerpoint/2010/main" val="28165208"/>
       </p:ext>
     </p:extLst>
   </p:cSld>
   <p:clrMapOvr>
     <a:masterClrMapping/>
   </p:clrMapOvr>
+  <p:timing>
+    <p:tnLst>
+      <p:par>
+        <p:cTn id="1" dur="indefinite" restart="never" nodeType="tmRoot">
+          <p:childTnLst>
+            <p:seq concurrent="1" nextAc="seek">
+              <p:cTn id="2" dur="indefinite" nodeType="mainSeq">
+                <p:childTnLst>
+                  <p:par>
+                    <p:cTn id="3" fill="hold">
+                      <p:stCondLst>
+                        <p:cond delay="indefinite"/>
+                      </p:stCondLst>
+                      <p:childTnLst>
+                        <p:par>
+                          <p:cTn id="4" fill="hold">
+                            <p:stCondLst>
+                              <p:cond delay="0"/>
+                            </p:stCondLst>
+                            <p:childTnLst>
+                              <p:par>
+                                <p:cTn id="5" presetID="1" presetClass="entr" presetSubtype="0" fill="hold" nodeType="clickEffect">
+                                  <p:stCondLst>
+                                    <p:cond delay="0"/>
+                                  </p:stCondLst>
+                                  <p:childTnLst>
+                                    <p:set>
+                                      <p:cBhvr>
+                                        <p:cTn id="6" dur="1" fill="hold">
+                                          <p:stCondLst>
+                                            <p:cond delay="0"/>
+                                          </p:stCondLst>
+                                        </p:cTn>
+                                        <p:tgtEl>
+                                          <p:spTgt spid="24"/>
+                                        </p:tgtEl>
+                                        <p:attrNameLst>
+                                          <p:attrName>style.visibility</p:attrName>
+                                        </p:attrNameLst>
+                                      </p:cBhvr>
+                                      <p:to>
+                                        <p:strVal val="visible"/>
+                                      </p:to>
+                                    </p:set>
+                                  </p:childTnLst>
+                                </p:cTn>
+                              </p:par>
+                            </p:childTnLst>
+                          </p:cTn>
+                        </p:par>
+                      </p:childTnLst>
+                    </p:cTn>
+                  </p:par>
+                </p:childTnLst>
+              </p:cTn>
+              <p:prevCondLst>
+                <p:cond evt="onPrev" delay="0">
+                  <p:tgtEl>
+                    <p:sldTgt/>
+                  </p:tgtEl>
+                </p:cond>
+              </p:prevCondLst>
+              <p:nextCondLst>
+                <p:cond evt="onNext" delay="0">
+                  <p:tgtEl>
+                    <p:sldTgt/>
+                  </p:tgtEl>
+                </p:cond>
+              </p:nextCondLst>
+            </p:seq>
+          </p:childTnLst>
+        </p:cTn>
+      </p:par>
+    </p:tnLst>
+  </p:timing>
 </p:sld>
 </file>
 

</xml_diff>

<commit_message>
Added pics to pp
</commit_message>
<xml_diff>
--- a/machine_learning_pp.pptx
+++ b/machine_learning_pp.pptx
@@ -130,7 +130,7 @@
 <file path=ppt/revisionInfo.xml><?xml version="1.0" encoding="utf-8"?>
 <p1510:revInfo xmlns:a="http://schemas.openxmlformats.org/drawingml/2006/main" xmlns:r="http://schemas.openxmlformats.org/officeDocument/2006/relationships" xmlns:p1510="http://schemas.microsoft.com/office/powerpoint/2015/10/main">
   <p1510:revLst>
-    <p1510:client id="{68179169-3B82-4F98-821B-0333AA1943BB}" v="22" dt="2020-03-02T21:33:25.948"/>
+    <p1510:client id="{68179169-3B82-4F98-821B-0333AA1943BB}" v="27" dt="2020-03-02T22:12:20.728"/>
   </p1510:revLst>
 </p1510:revInfo>
 </file>
@@ -5307,6 +5307,42 @@
           </a:p>
         </p:txBody>
       </p:sp>
+      <p:pic>
+        <p:nvPicPr>
+          <p:cNvPr id="10" name="Picture 9" descr="A picture containing drawing&#10;&#10;Description automatically generated">
+            <a:extLst>
+              <a:ext uri="{FF2B5EF4-FFF2-40B4-BE49-F238E27FC236}">
+                <a16:creationId xmlns:a16="http://schemas.microsoft.com/office/drawing/2014/main" id="{038A6152-C680-4201-B430-71552ADBA156}"/>
+              </a:ext>
+            </a:extLst>
+          </p:cNvPr>
+          <p:cNvPicPr>
+            <a:picLocks noChangeAspect="1"/>
+          </p:cNvPicPr>
+          <p:nvPr/>
+        </p:nvPicPr>
+        <p:blipFill>
+          <a:blip r:embed="rId2">
+            <a:extLst>
+              <a:ext uri="{28A0092B-C50C-407E-A947-70E740481C1C}">
+                <a14:useLocalDpi xmlns:a14="http://schemas.microsoft.com/office/drawing/2010/main" val="0"/>
+              </a:ext>
+            </a:extLst>
+          </a:blip>
+          <a:stretch>
+            <a:fillRect/>
+          </a:stretch>
+        </p:blipFill>
+        <p:spPr>
+          <a:xfrm>
+            <a:off x="8127611" y="60960"/>
+            <a:ext cx="2362200" cy="1676400"/>
+          </a:xfrm>
+          <a:prstGeom prst="rect">
+            <a:avLst/>
+          </a:prstGeom>
+        </p:spPr>
+      </p:pic>
     </p:spTree>
     <p:extLst>
       <p:ext uri="{BB962C8B-B14F-4D97-AF65-F5344CB8AC3E}">
@@ -5898,6 +5934,42 @@
           </a:p>
         </p:txBody>
       </p:sp>
+      <p:pic>
+        <p:nvPicPr>
+          <p:cNvPr id="7" name="Picture 6" descr="A picture containing drawing&#10;&#10;Description automatically generated">
+            <a:extLst>
+              <a:ext uri="{FF2B5EF4-FFF2-40B4-BE49-F238E27FC236}">
+                <a16:creationId xmlns:a16="http://schemas.microsoft.com/office/drawing/2014/main" id="{59FCE06F-77E2-45A0-9250-628D68D774CC}"/>
+              </a:ext>
+            </a:extLst>
+          </p:cNvPr>
+          <p:cNvPicPr>
+            <a:picLocks noChangeAspect="1"/>
+          </p:cNvPicPr>
+          <p:nvPr/>
+        </p:nvPicPr>
+        <p:blipFill>
+          <a:blip r:embed="rId2">
+            <a:extLst>
+              <a:ext uri="{28A0092B-C50C-407E-A947-70E740481C1C}">
+                <a14:useLocalDpi xmlns:a14="http://schemas.microsoft.com/office/drawing/2010/main" val="0"/>
+              </a:ext>
+            </a:extLst>
+          </a:blip>
+          <a:stretch>
+            <a:fillRect/>
+          </a:stretch>
+        </p:blipFill>
+        <p:spPr>
+          <a:xfrm>
+            <a:off x="8498625" y="202356"/>
+            <a:ext cx="2419350" cy="1619250"/>
+          </a:xfrm>
+          <a:prstGeom prst="rect">
+            <a:avLst/>
+          </a:prstGeom>
+        </p:spPr>
+      </p:pic>
     </p:spTree>
     <p:extLst>
       <p:ext uri="{BB962C8B-B14F-4D97-AF65-F5344CB8AC3E}">
@@ -6504,6 +6576,42 @@
           </a:p>
         </p:txBody>
       </p:sp>
+      <p:pic>
+        <p:nvPicPr>
+          <p:cNvPr id="9" name="Picture 8" descr="A picture containing drawing&#10;&#10;Description automatically generated">
+            <a:extLst>
+              <a:ext uri="{FF2B5EF4-FFF2-40B4-BE49-F238E27FC236}">
+                <a16:creationId xmlns:a16="http://schemas.microsoft.com/office/drawing/2014/main" id="{B2238C64-E95F-4541-9623-910FCB001BB7}"/>
+              </a:ext>
+            </a:extLst>
+          </p:cNvPr>
+          <p:cNvPicPr>
+            <a:picLocks noChangeAspect="1"/>
+          </p:cNvPicPr>
+          <p:nvPr/>
+        </p:nvPicPr>
+        <p:blipFill>
+          <a:blip r:embed="rId2">
+            <a:extLst>
+              <a:ext uri="{28A0092B-C50C-407E-A947-70E740481C1C}">
+                <a14:useLocalDpi xmlns:a14="http://schemas.microsoft.com/office/drawing/2010/main" val="0"/>
+              </a:ext>
+            </a:extLst>
+          </a:blip>
+          <a:stretch>
+            <a:fillRect/>
+          </a:stretch>
+        </p:blipFill>
+        <p:spPr>
+          <a:xfrm>
+            <a:off x="8534605" y="151172"/>
+            <a:ext cx="1955206" cy="1690801"/>
+          </a:xfrm>
+          <a:prstGeom prst="rect">
+            <a:avLst/>
+          </a:prstGeom>
+        </p:spPr>
+      </p:pic>
     </p:spTree>
     <p:extLst>
       <p:ext uri="{BB962C8B-B14F-4D97-AF65-F5344CB8AC3E}">

</xml_diff>